<commit_message>
added slide to collimator.pptx with important dimensions for Tom
</commit_message>
<xml_diff>
--- a/drawings/collimator.pptx
+++ b/drawings/collimator.pptx
@@ -9,6 +9,7 @@
     <p:sldId id="259" r:id="rId3"/>
     <p:sldId id="261" r:id="rId4"/>
     <p:sldId id="260" r:id="rId5"/>
+    <p:sldId id="262" r:id="rId6"/>
   </p:sldIdLst>
   <p:sldSz cx="12192000" cy="7937500"/>
   <p:notesSz cx="6858000" cy="9144000"/>
@@ -246,7 +247,7 @@
           <a:p>
             <a:fld id="{B6709D3E-6545-6848-91E1-EE3676CBE7A9}" type="datetimeFigureOut">
               <a:rPr lang="en-US" smtClean="0"/>
-              <a:t>7/20/20</a:t>
+              <a:t>5/24/21</a:t>
             </a:fld>
             <a:endParaRPr lang="en-US"/>
           </a:p>
@@ -416,7 +417,7 @@
           <a:p>
             <a:fld id="{B6709D3E-6545-6848-91E1-EE3676CBE7A9}" type="datetimeFigureOut">
               <a:rPr lang="en-US" smtClean="0"/>
-              <a:t>7/20/20</a:t>
+              <a:t>5/24/21</a:t>
             </a:fld>
             <a:endParaRPr lang="en-US"/>
           </a:p>
@@ -596,7 +597,7 @@
           <a:p>
             <a:fld id="{B6709D3E-6545-6848-91E1-EE3676CBE7A9}" type="datetimeFigureOut">
               <a:rPr lang="en-US" smtClean="0"/>
-              <a:t>7/20/20</a:t>
+              <a:t>5/24/21</a:t>
             </a:fld>
             <a:endParaRPr lang="en-US"/>
           </a:p>
@@ -766,7 +767,7 @@
           <a:p>
             <a:fld id="{B6709D3E-6545-6848-91E1-EE3676CBE7A9}" type="datetimeFigureOut">
               <a:rPr lang="en-US" smtClean="0"/>
-              <a:t>7/20/20</a:t>
+              <a:t>5/24/21</a:t>
             </a:fld>
             <a:endParaRPr lang="en-US"/>
           </a:p>
@@ -1010,7 +1011,7 @@
           <a:p>
             <a:fld id="{B6709D3E-6545-6848-91E1-EE3676CBE7A9}" type="datetimeFigureOut">
               <a:rPr lang="en-US" smtClean="0"/>
-              <a:t>7/20/20</a:t>
+              <a:t>5/24/21</a:t>
             </a:fld>
             <a:endParaRPr lang="en-US"/>
           </a:p>
@@ -1242,7 +1243,7 @@
           <a:p>
             <a:fld id="{B6709D3E-6545-6848-91E1-EE3676CBE7A9}" type="datetimeFigureOut">
               <a:rPr lang="en-US" smtClean="0"/>
-              <a:t>7/20/20</a:t>
+              <a:t>5/24/21</a:t>
             </a:fld>
             <a:endParaRPr lang="en-US"/>
           </a:p>
@@ -1609,7 +1610,7 @@
           <a:p>
             <a:fld id="{B6709D3E-6545-6848-91E1-EE3676CBE7A9}" type="datetimeFigureOut">
               <a:rPr lang="en-US" smtClean="0"/>
-              <a:t>7/20/20</a:t>
+              <a:t>5/24/21</a:t>
             </a:fld>
             <a:endParaRPr lang="en-US"/>
           </a:p>
@@ -1727,7 +1728,7 @@
           <a:p>
             <a:fld id="{B6709D3E-6545-6848-91E1-EE3676CBE7A9}" type="datetimeFigureOut">
               <a:rPr lang="en-US" smtClean="0"/>
-              <a:t>7/20/20</a:t>
+              <a:t>5/24/21</a:t>
             </a:fld>
             <a:endParaRPr lang="en-US"/>
           </a:p>
@@ -1822,7 +1823,7 @@
           <a:p>
             <a:fld id="{B6709D3E-6545-6848-91E1-EE3676CBE7A9}" type="datetimeFigureOut">
               <a:rPr lang="en-US" smtClean="0"/>
-              <a:t>7/20/20</a:t>
+              <a:t>5/24/21</a:t>
             </a:fld>
             <a:endParaRPr lang="en-US"/>
           </a:p>
@@ -2099,7 +2100,7 @@
           <a:p>
             <a:fld id="{B6709D3E-6545-6848-91E1-EE3676CBE7A9}" type="datetimeFigureOut">
               <a:rPr lang="en-US" smtClean="0"/>
-              <a:t>7/20/20</a:t>
+              <a:t>5/24/21</a:t>
             </a:fld>
             <a:endParaRPr lang="en-US"/>
           </a:p>
@@ -2356,7 +2357,7 @@
           <a:p>
             <a:fld id="{B6709D3E-6545-6848-91E1-EE3676CBE7A9}" type="datetimeFigureOut">
               <a:rPr lang="en-US" smtClean="0"/>
-              <a:t>7/20/20</a:t>
+              <a:t>5/24/21</a:t>
             </a:fld>
             <a:endParaRPr lang="en-US"/>
           </a:p>
@@ -2569,7 +2570,7 @@
           <a:p>
             <a:fld id="{B6709D3E-6545-6848-91E1-EE3676CBE7A9}" type="datetimeFigureOut">
               <a:rPr lang="en-US" smtClean="0"/>
-              <a:t>7/20/20</a:t>
+              <a:t>5/24/21</a:t>
             </a:fld>
             <a:endParaRPr lang="en-US"/>
           </a:p>
@@ -4476,6 +4477,90 @@
           </a:p>
         </p:txBody>
       </p:sp>
+      <p:cxnSp>
+        <p:nvCxnSpPr>
+          <p:cNvPr id="41" name="Straight Arrow Connector 40">
+            <a:extLst>
+              <a:ext uri="{FF2B5EF4-FFF2-40B4-BE49-F238E27FC236}">
+                <a16:creationId xmlns:a16="http://schemas.microsoft.com/office/drawing/2014/main" id="{AF0B0EEC-416A-2741-A494-A9E82B8C65B2}"/>
+              </a:ext>
+            </a:extLst>
+          </p:cNvPr>
+          <p:cNvCxnSpPr>
+            <a:cxnSpLocks/>
+          </p:cNvCxnSpPr>
+          <p:nvPr/>
+        </p:nvCxnSpPr>
+        <p:spPr>
+          <a:xfrm flipH="1">
+            <a:off x="51793" y="2273316"/>
+            <a:ext cx="1080000" cy="0"/>
+          </a:xfrm>
+          <a:prstGeom prst="straightConnector1">
+            <a:avLst/>
+          </a:prstGeom>
+          <a:ln w="38100">
+            <a:solidFill>
+              <a:schemeClr val="bg1"/>
+            </a:solidFill>
+            <a:headEnd type="triangle"/>
+            <a:tailEnd type="triangle"/>
+          </a:ln>
+        </p:spPr>
+        <p:style>
+          <a:lnRef idx="1">
+            <a:schemeClr val="accent1"/>
+          </a:lnRef>
+          <a:fillRef idx="0">
+            <a:schemeClr val="accent1"/>
+          </a:fillRef>
+          <a:effectRef idx="0">
+            <a:schemeClr val="accent1"/>
+          </a:effectRef>
+          <a:fontRef idx="minor">
+            <a:schemeClr val="tx1"/>
+          </a:fontRef>
+        </p:style>
+      </p:cxnSp>
+      <p:sp>
+        <p:nvSpPr>
+          <p:cNvPr id="42" name="TextBox 41">
+            <a:extLst>
+              <a:ext uri="{FF2B5EF4-FFF2-40B4-BE49-F238E27FC236}">
+                <a16:creationId xmlns:a16="http://schemas.microsoft.com/office/drawing/2014/main" id="{09F14992-14D4-B448-B8DC-18AEDB49AC7F}"/>
+              </a:ext>
+            </a:extLst>
+          </p:cNvPr>
+          <p:cNvSpPr txBox="1"/>
+          <p:nvPr/>
+        </p:nvSpPr>
+        <p:spPr>
+          <a:xfrm>
+            <a:off x="223909" y="2352143"/>
+            <a:ext cx="776175" cy="369332"/>
+          </a:xfrm>
+          <a:prstGeom prst="rect">
+            <a:avLst/>
+          </a:prstGeom>
+          <a:noFill/>
+        </p:spPr>
+        <p:txBody>
+          <a:bodyPr wrap="none" rtlCol="0">
+            <a:spAutoFit/>
+          </a:bodyPr>
+          <a:lstStyle/>
+          <a:p>
+            <a:r>
+              <a:rPr lang="en-US" dirty="0">
+                <a:solidFill>
+                  <a:schemeClr val="bg1"/>
+                </a:solidFill>
+              </a:rPr>
+              <a:t>3 mm </a:t>
+            </a:r>
+          </a:p>
+        </p:txBody>
+      </p:sp>
     </p:spTree>
     <p:extLst>
       <p:ext uri="{BB962C8B-B14F-4D97-AF65-F5344CB8AC3E}">
@@ -6109,23 +6194,7 @@
                   <a:schemeClr val="bg1"/>
                 </a:solidFill>
               </a:rPr>
-              <a:t>4</a:t>
-            </a:r>
-            <a:r>
-              <a:rPr lang="en-US">
-                <a:solidFill>
-                  <a:schemeClr val="bg1"/>
-                </a:solidFill>
-              </a:rPr>
-              <a:t>.5 </a:t>
-            </a:r>
-            <a:r>
-              <a:rPr lang="en-US" dirty="0">
-                <a:solidFill>
-                  <a:schemeClr val="bg1"/>
-                </a:solidFill>
-              </a:rPr>
-              <a:t>mm </a:t>
+              <a:t>4.5 mm </a:t>
             </a:r>
           </a:p>
         </p:txBody>
@@ -9441,6 +9510,3297 @@
 </p:sld>
 </file>
 
+<file path=ppt/slides/slide5.xml><?xml version="1.0" encoding="utf-8"?>
+<p:sld xmlns:a="http://schemas.openxmlformats.org/drawingml/2006/main" xmlns:r="http://schemas.openxmlformats.org/officeDocument/2006/relationships" xmlns:p="http://schemas.openxmlformats.org/presentationml/2006/main">
+  <p:cSld>
+    <p:spTree>
+      <p:nvGrpSpPr>
+        <p:cNvPr id="1" name=""/>
+        <p:cNvGrpSpPr/>
+        <p:nvPr/>
+      </p:nvGrpSpPr>
+      <p:grpSpPr>
+        <a:xfrm>
+          <a:off x="0" y="0"/>
+          <a:ext cx="0" cy="0"/>
+          <a:chOff x="0" y="0"/>
+          <a:chExt cx="0" cy="0"/>
+        </a:xfrm>
+      </p:grpSpPr>
+      <p:grpSp>
+        <p:nvGrpSpPr>
+          <p:cNvPr id="8" name="Group 7">
+            <a:extLst>
+              <a:ext uri="{FF2B5EF4-FFF2-40B4-BE49-F238E27FC236}">
+                <a16:creationId xmlns:a16="http://schemas.microsoft.com/office/drawing/2014/main" id="{9F38C36E-D876-0342-912F-323D22C48573}"/>
+              </a:ext>
+            </a:extLst>
+          </p:cNvPr>
+          <p:cNvGrpSpPr/>
+          <p:nvPr/>
+        </p:nvGrpSpPr>
+        <p:grpSpPr>
+          <a:xfrm>
+            <a:off x="51793" y="836314"/>
+            <a:ext cx="11520000" cy="6120000"/>
+            <a:chOff x="336000" y="0"/>
+            <a:chExt cx="11520000" cy="6120000"/>
+          </a:xfrm>
+        </p:grpSpPr>
+        <p:sp>
+          <p:nvSpPr>
+            <p:cNvPr id="2" name="Rectangle 1">
+              <a:extLst>
+                <a:ext uri="{FF2B5EF4-FFF2-40B4-BE49-F238E27FC236}">
+                  <a16:creationId xmlns:a16="http://schemas.microsoft.com/office/drawing/2014/main" id="{918305F0-01C2-F049-AF4A-4296C84F59C0}"/>
+                </a:ext>
+              </a:extLst>
+            </p:cNvPr>
+            <p:cNvSpPr>
+              <a:spLocks noChangeAspect="1"/>
+            </p:cNvSpPr>
+            <p:nvPr/>
+          </p:nvSpPr>
+          <p:spPr>
+            <a:xfrm>
+              <a:off x="336000" y="0"/>
+              <a:ext cx="11520000" cy="3240000"/>
+            </a:xfrm>
+            <a:prstGeom prst="rect">
+              <a:avLst/>
+            </a:prstGeom>
+            <a:solidFill>
+              <a:schemeClr val="tx1"/>
+            </a:solidFill>
+            <a:ln>
+              <a:noFill/>
+            </a:ln>
+          </p:spPr>
+          <p:style>
+            <a:lnRef idx="2">
+              <a:schemeClr val="accent1">
+                <a:shade val="50000"/>
+              </a:schemeClr>
+            </a:lnRef>
+            <a:fillRef idx="1">
+              <a:schemeClr val="accent1"/>
+            </a:fillRef>
+            <a:effectRef idx="0">
+              <a:schemeClr val="accent1"/>
+            </a:effectRef>
+            <a:fontRef idx="minor">
+              <a:schemeClr val="lt1"/>
+            </a:fontRef>
+          </p:style>
+          <p:txBody>
+            <a:bodyPr rtlCol="0" anchor="ctr"/>
+            <a:lstStyle/>
+            <a:p>
+              <a:pPr algn="ctr"/>
+              <a:endParaRPr lang="en-US" dirty="0"/>
+            </a:p>
+          </p:txBody>
+        </p:sp>
+        <p:sp>
+          <p:nvSpPr>
+            <p:cNvPr id="3" name="Rectangle 2">
+              <a:extLst>
+                <a:ext uri="{FF2B5EF4-FFF2-40B4-BE49-F238E27FC236}">
+                  <a16:creationId xmlns:a16="http://schemas.microsoft.com/office/drawing/2014/main" id="{68DE3922-3FBD-9144-BE9E-16700B413A2E}"/>
+                </a:ext>
+              </a:extLst>
+            </p:cNvPr>
+            <p:cNvSpPr>
+              <a:spLocks noChangeAspect="1"/>
+            </p:cNvSpPr>
+            <p:nvPr/>
+          </p:nvSpPr>
+          <p:spPr>
+            <a:xfrm>
+              <a:off x="4296000" y="3240000"/>
+              <a:ext cx="3600000" cy="2880000"/>
+            </a:xfrm>
+            <a:prstGeom prst="rect">
+              <a:avLst/>
+            </a:prstGeom>
+            <a:solidFill>
+              <a:schemeClr val="tx1"/>
+            </a:solidFill>
+            <a:ln>
+              <a:noFill/>
+            </a:ln>
+          </p:spPr>
+          <p:style>
+            <a:lnRef idx="2">
+              <a:schemeClr val="accent1">
+                <a:shade val="50000"/>
+              </a:schemeClr>
+            </a:lnRef>
+            <a:fillRef idx="1">
+              <a:schemeClr val="accent1"/>
+            </a:fillRef>
+            <a:effectRef idx="0">
+              <a:schemeClr val="accent1"/>
+            </a:effectRef>
+            <a:fontRef idx="minor">
+              <a:schemeClr val="lt1"/>
+            </a:fontRef>
+          </p:style>
+          <p:txBody>
+            <a:bodyPr rtlCol="0" anchor="ctr"/>
+            <a:lstStyle/>
+            <a:p>
+              <a:pPr algn="ctr"/>
+              <a:endParaRPr lang="en-US"/>
+            </a:p>
+          </p:txBody>
+        </p:sp>
+        <p:sp>
+          <p:nvSpPr>
+            <p:cNvPr id="4" name="Rectangle 3">
+              <a:extLst>
+                <a:ext uri="{FF2B5EF4-FFF2-40B4-BE49-F238E27FC236}">
+                  <a16:creationId xmlns:a16="http://schemas.microsoft.com/office/drawing/2014/main" id="{7EB223F4-AF8E-374A-92CD-B4B803D0915D}"/>
+                </a:ext>
+              </a:extLst>
+            </p:cNvPr>
+            <p:cNvSpPr>
+              <a:spLocks noChangeAspect="1"/>
+            </p:cNvSpPr>
+            <p:nvPr/>
+          </p:nvSpPr>
+          <p:spPr>
+            <a:xfrm>
+              <a:off x="1416000" y="1080000"/>
+              <a:ext cx="9360000" cy="900000"/>
+            </a:xfrm>
+            <a:prstGeom prst="rect">
+              <a:avLst/>
+            </a:prstGeom>
+            <a:solidFill>
+              <a:schemeClr val="bg2"/>
+            </a:solidFill>
+            <a:ln>
+              <a:noFill/>
+            </a:ln>
+          </p:spPr>
+          <p:style>
+            <a:lnRef idx="2">
+              <a:schemeClr val="accent1">
+                <a:shade val="50000"/>
+              </a:schemeClr>
+            </a:lnRef>
+            <a:fillRef idx="1">
+              <a:schemeClr val="accent1"/>
+            </a:fillRef>
+            <a:effectRef idx="0">
+              <a:schemeClr val="accent1"/>
+            </a:effectRef>
+            <a:fontRef idx="minor">
+              <a:schemeClr val="lt1"/>
+            </a:fontRef>
+          </p:style>
+          <p:txBody>
+            <a:bodyPr rtlCol="0" anchor="ctr"/>
+            <a:lstStyle/>
+            <a:p>
+              <a:pPr algn="ctr"/>
+              <a:endParaRPr lang="en-US"/>
+            </a:p>
+          </p:txBody>
+        </p:sp>
+        <p:sp>
+          <p:nvSpPr>
+            <p:cNvPr id="5" name="Rectangle 4">
+              <a:extLst>
+                <a:ext uri="{FF2B5EF4-FFF2-40B4-BE49-F238E27FC236}">
+                  <a16:creationId xmlns:a16="http://schemas.microsoft.com/office/drawing/2014/main" id="{7BDB20B5-68D0-0B4F-8E60-B356B2CAEE40}"/>
+                </a:ext>
+              </a:extLst>
+            </p:cNvPr>
+            <p:cNvSpPr>
+              <a:spLocks noChangeAspect="1"/>
+            </p:cNvSpPr>
+            <p:nvPr/>
+          </p:nvSpPr>
+          <p:spPr>
+            <a:xfrm>
+              <a:off x="3576000" y="1980000"/>
+              <a:ext cx="5040000" cy="180000"/>
+            </a:xfrm>
+            <a:prstGeom prst="rect">
+              <a:avLst/>
+            </a:prstGeom>
+            <a:solidFill>
+              <a:schemeClr val="bg2"/>
+            </a:solidFill>
+            <a:ln>
+              <a:noFill/>
+            </a:ln>
+          </p:spPr>
+          <p:style>
+            <a:lnRef idx="2">
+              <a:schemeClr val="accent1">
+                <a:shade val="50000"/>
+              </a:schemeClr>
+            </a:lnRef>
+            <a:fillRef idx="1">
+              <a:schemeClr val="accent1"/>
+            </a:fillRef>
+            <a:effectRef idx="0">
+              <a:schemeClr val="accent1"/>
+            </a:effectRef>
+            <a:fontRef idx="minor">
+              <a:schemeClr val="lt1"/>
+            </a:fontRef>
+          </p:style>
+          <p:txBody>
+            <a:bodyPr rtlCol="0" anchor="ctr"/>
+            <a:lstStyle/>
+            <a:p>
+              <a:pPr algn="ctr"/>
+              <a:endParaRPr lang="en-US"/>
+            </a:p>
+          </p:txBody>
+        </p:sp>
+        <p:sp>
+          <p:nvSpPr>
+            <p:cNvPr id="6" name="Rectangle 5">
+              <a:extLst>
+                <a:ext uri="{FF2B5EF4-FFF2-40B4-BE49-F238E27FC236}">
+                  <a16:creationId xmlns:a16="http://schemas.microsoft.com/office/drawing/2014/main" id="{F52198CD-F7D8-304A-AF20-F400A5684FFF}"/>
+                </a:ext>
+              </a:extLst>
+            </p:cNvPr>
+            <p:cNvSpPr>
+              <a:spLocks noChangeAspect="1"/>
+            </p:cNvSpPr>
+            <p:nvPr/>
+          </p:nvSpPr>
+          <p:spPr>
+            <a:xfrm>
+              <a:off x="6006000" y="2160000"/>
+              <a:ext cx="360000" cy="3960000"/>
+            </a:xfrm>
+            <a:prstGeom prst="rect">
+              <a:avLst/>
+            </a:prstGeom>
+            <a:solidFill>
+              <a:schemeClr val="bg2"/>
+            </a:solidFill>
+            <a:ln>
+              <a:noFill/>
+            </a:ln>
+          </p:spPr>
+          <p:style>
+            <a:lnRef idx="2">
+              <a:schemeClr val="accent1">
+                <a:shade val="50000"/>
+              </a:schemeClr>
+            </a:lnRef>
+            <a:fillRef idx="1">
+              <a:schemeClr val="accent1"/>
+            </a:fillRef>
+            <a:effectRef idx="0">
+              <a:schemeClr val="accent1"/>
+            </a:effectRef>
+            <a:fontRef idx="minor">
+              <a:schemeClr val="lt1"/>
+            </a:fontRef>
+          </p:style>
+          <p:txBody>
+            <a:bodyPr rtlCol="0" anchor="ctr"/>
+            <a:lstStyle/>
+            <a:p>
+              <a:pPr algn="ctr"/>
+              <a:endParaRPr lang="en-US"/>
+            </a:p>
+          </p:txBody>
+        </p:sp>
+        <p:sp>
+          <p:nvSpPr>
+            <p:cNvPr id="7" name="Rectangle 6">
+              <a:extLst>
+                <a:ext uri="{FF2B5EF4-FFF2-40B4-BE49-F238E27FC236}">
+                  <a16:creationId xmlns:a16="http://schemas.microsoft.com/office/drawing/2014/main" id="{09492C1A-DD9A-2F4F-8E70-6ED4455BB0FE}"/>
+                </a:ext>
+              </a:extLst>
+            </p:cNvPr>
+            <p:cNvSpPr>
+              <a:spLocks noChangeAspect="1"/>
+            </p:cNvSpPr>
+            <p:nvPr/>
+          </p:nvSpPr>
+          <p:spPr>
+            <a:xfrm>
+              <a:off x="1596000" y="1800000"/>
+              <a:ext cx="9000000" cy="180000"/>
+            </a:xfrm>
+            <a:prstGeom prst="rect">
+              <a:avLst/>
+            </a:prstGeom>
+          </p:spPr>
+          <p:style>
+            <a:lnRef idx="2">
+              <a:schemeClr val="accent1">
+                <a:shade val="50000"/>
+              </a:schemeClr>
+            </a:lnRef>
+            <a:fillRef idx="1">
+              <a:schemeClr val="accent1"/>
+            </a:fillRef>
+            <a:effectRef idx="0">
+              <a:schemeClr val="accent1"/>
+            </a:effectRef>
+            <a:fontRef idx="minor">
+              <a:schemeClr val="lt1"/>
+            </a:fontRef>
+          </p:style>
+          <p:txBody>
+            <a:bodyPr rtlCol="0" anchor="ctr"/>
+            <a:lstStyle/>
+            <a:p>
+              <a:pPr algn="ctr"/>
+              <a:endParaRPr lang="en-US"/>
+            </a:p>
+          </p:txBody>
+        </p:sp>
+      </p:grpSp>
+      <p:cxnSp>
+        <p:nvCxnSpPr>
+          <p:cNvPr id="9" name="Straight Arrow Connector 8">
+            <a:extLst>
+              <a:ext uri="{FF2B5EF4-FFF2-40B4-BE49-F238E27FC236}">
+                <a16:creationId xmlns:a16="http://schemas.microsoft.com/office/drawing/2014/main" id="{408521E9-52BE-544F-A6B0-E63F90B922F5}"/>
+              </a:ext>
+            </a:extLst>
+          </p:cNvPr>
+          <p:cNvCxnSpPr>
+            <a:cxnSpLocks/>
+          </p:cNvCxnSpPr>
+          <p:nvPr/>
+        </p:nvCxnSpPr>
+        <p:spPr>
+          <a:xfrm>
+            <a:off x="51793" y="695610"/>
+            <a:ext cx="11520000" cy="0"/>
+          </a:xfrm>
+          <a:prstGeom prst="straightConnector1">
+            <a:avLst/>
+          </a:prstGeom>
+          <a:ln w="38100">
+            <a:solidFill>
+              <a:schemeClr val="tx1"/>
+            </a:solidFill>
+            <a:headEnd type="triangle"/>
+            <a:tailEnd type="triangle"/>
+          </a:ln>
+        </p:spPr>
+        <p:style>
+          <a:lnRef idx="1">
+            <a:schemeClr val="accent1"/>
+          </a:lnRef>
+          <a:fillRef idx="0">
+            <a:schemeClr val="accent1"/>
+          </a:fillRef>
+          <a:effectRef idx="0">
+            <a:schemeClr val="accent1"/>
+          </a:effectRef>
+          <a:fontRef idx="minor">
+            <a:schemeClr val="tx1"/>
+          </a:fontRef>
+        </p:style>
+      </p:cxnSp>
+      <p:sp>
+        <p:nvSpPr>
+          <p:cNvPr id="10" name="TextBox 9">
+            <a:extLst>
+              <a:ext uri="{FF2B5EF4-FFF2-40B4-BE49-F238E27FC236}">
+                <a16:creationId xmlns:a16="http://schemas.microsoft.com/office/drawing/2014/main" id="{FDC808E1-0647-684C-BFF2-98EAA00B9A66}"/>
+              </a:ext>
+            </a:extLst>
+          </p:cNvPr>
+          <p:cNvSpPr txBox="1"/>
+          <p:nvPr/>
+        </p:nvSpPr>
+        <p:spPr>
+          <a:xfrm>
+            <a:off x="5481646" y="454625"/>
+            <a:ext cx="840295" cy="369332"/>
+          </a:xfrm>
+          <a:prstGeom prst="rect">
+            <a:avLst/>
+          </a:prstGeom>
+          <a:solidFill>
+            <a:schemeClr val="bg1"/>
+          </a:solidFill>
+        </p:spPr>
+        <p:txBody>
+          <a:bodyPr wrap="none" rtlCol="0">
+            <a:spAutoFit/>
+          </a:bodyPr>
+          <a:lstStyle/>
+          <a:p>
+            <a:r>
+              <a:rPr lang="en-US" dirty="0"/>
+              <a:t>32 mm</a:t>
+            </a:r>
+          </a:p>
+        </p:txBody>
+      </p:sp>
+      <p:cxnSp>
+        <p:nvCxnSpPr>
+          <p:cNvPr id="13" name="Straight Arrow Connector 12">
+            <a:extLst>
+              <a:ext uri="{FF2B5EF4-FFF2-40B4-BE49-F238E27FC236}">
+                <a16:creationId xmlns:a16="http://schemas.microsoft.com/office/drawing/2014/main" id="{1675E468-2B75-B04D-99E3-DB2DF1A3D85C}"/>
+              </a:ext>
+            </a:extLst>
+          </p:cNvPr>
+          <p:cNvCxnSpPr>
+            <a:cxnSpLocks/>
+          </p:cNvCxnSpPr>
+          <p:nvPr/>
+        </p:nvCxnSpPr>
+        <p:spPr>
+          <a:xfrm flipV="1">
+            <a:off x="11703502" y="836316"/>
+            <a:ext cx="0" cy="3239999"/>
+          </a:xfrm>
+          <a:prstGeom prst="straightConnector1">
+            <a:avLst/>
+          </a:prstGeom>
+          <a:ln w="38100">
+            <a:solidFill>
+              <a:schemeClr val="tx1"/>
+            </a:solidFill>
+            <a:headEnd type="triangle"/>
+            <a:tailEnd type="triangle"/>
+          </a:ln>
+        </p:spPr>
+        <p:style>
+          <a:lnRef idx="1">
+            <a:schemeClr val="accent1"/>
+          </a:lnRef>
+          <a:fillRef idx="0">
+            <a:schemeClr val="accent1"/>
+          </a:fillRef>
+          <a:effectRef idx="0">
+            <a:schemeClr val="accent1"/>
+          </a:effectRef>
+          <a:fontRef idx="minor">
+            <a:schemeClr val="tx1"/>
+          </a:fontRef>
+        </p:style>
+      </p:cxnSp>
+      <p:sp>
+        <p:nvSpPr>
+          <p:cNvPr id="12" name="TextBox 11">
+            <a:extLst>
+              <a:ext uri="{FF2B5EF4-FFF2-40B4-BE49-F238E27FC236}">
+                <a16:creationId xmlns:a16="http://schemas.microsoft.com/office/drawing/2014/main" id="{D53B1CC3-A82C-5341-8070-789A734D1CD5}"/>
+              </a:ext>
+            </a:extLst>
+          </p:cNvPr>
+          <p:cNvSpPr txBox="1"/>
+          <p:nvPr/>
+        </p:nvSpPr>
+        <p:spPr>
+          <a:xfrm>
+            <a:off x="11571794" y="2181648"/>
+            <a:ext cx="723275" cy="369332"/>
+          </a:xfrm>
+          <a:prstGeom prst="rect">
+            <a:avLst/>
+          </a:prstGeom>
+          <a:solidFill>
+            <a:schemeClr val="bg1"/>
+          </a:solidFill>
+        </p:spPr>
+        <p:txBody>
+          <a:bodyPr wrap="none" rtlCol="0">
+            <a:spAutoFit/>
+          </a:bodyPr>
+          <a:lstStyle/>
+          <a:p>
+            <a:r>
+              <a:rPr lang="en-US" dirty="0"/>
+              <a:t>9 mm</a:t>
+            </a:r>
+          </a:p>
+        </p:txBody>
+      </p:sp>
+      <p:cxnSp>
+        <p:nvCxnSpPr>
+          <p:cNvPr id="15" name="Straight Arrow Connector 14">
+            <a:extLst>
+              <a:ext uri="{FF2B5EF4-FFF2-40B4-BE49-F238E27FC236}">
+                <a16:creationId xmlns:a16="http://schemas.microsoft.com/office/drawing/2014/main" id="{0F40040A-6ADD-6246-8F6B-DC1AFF0B8D04}"/>
+              </a:ext>
+            </a:extLst>
+          </p:cNvPr>
+          <p:cNvCxnSpPr>
+            <a:cxnSpLocks/>
+          </p:cNvCxnSpPr>
+          <p:nvPr/>
+        </p:nvCxnSpPr>
+        <p:spPr>
+          <a:xfrm flipV="1">
+            <a:off x="8015155" y="4076316"/>
+            <a:ext cx="0" cy="2879999"/>
+          </a:xfrm>
+          <a:prstGeom prst="straightConnector1">
+            <a:avLst/>
+          </a:prstGeom>
+          <a:ln w="38100">
+            <a:solidFill>
+              <a:schemeClr val="tx1"/>
+            </a:solidFill>
+            <a:headEnd type="triangle"/>
+            <a:tailEnd type="triangle"/>
+          </a:ln>
+        </p:spPr>
+        <p:style>
+          <a:lnRef idx="1">
+            <a:schemeClr val="accent1"/>
+          </a:lnRef>
+          <a:fillRef idx="0">
+            <a:schemeClr val="accent1"/>
+          </a:fillRef>
+          <a:effectRef idx="0">
+            <a:schemeClr val="accent1"/>
+          </a:effectRef>
+          <a:fontRef idx="minor">
+            <a:schemeClr val="tx1"/>
+          </a:fontRef>
+        </p:style>
+      </p:cxnSp>
+      <p:sp>
+        <p:nvSpPr>
+          <p:cNvPr id="16" name="TextBox 15">
+            <a:extLst>
+              <a:ext uri="{FF2B5EF4-FFF2-40B4-BE49-F238E27FC236}">
+                <a16:creationId xmlns:a16="http://schemas.microsoft.com/office/drawing/2014/main" id="{C9F3CA14-293E-F947-9057-9DFF52CBD184}"/>
+              </a:ext>
+            </a:extLst>
+          </p:cNvPr>
+          <p:cNvSpPr txBox="1"/>
+          <p:nvPr/>
+        </p:nvSpPr>
+        <p:spPr>
+          <a:xfrm>
+            <a:off x="7667739" y="5331648"/>
+            <a:ext cx="723275" cy="369332"/>
+          </a:xfrm>
+          <a:prstGeom prst="rect">
+            <a:avLst/>
+          </a:prstGeom>
+          <a:solidFill>
+            <a:schemeClr val="bg1"/>
+          </a:solidFill>
+        </p:spPr>
+        <p:txBody>
+          <a:bodyPr wrap="none" rtlCol="0">
+            <a:spAutoFit/>
+          </a:bodyPr>
+          <a:lstStyle/>
+          <a:p>
+            <a:r>
+              <a:rPr lang="en-US" dirty="0"/>
+              <a:t>8 mm</a:t>
+            </a:r>
+          </a:p>
+        </p:txBody>
+      </p:sp>
+      <p:cxnSp>
+        <p:nvCxnSpPr>
+          <p:cNvPr id="18" name="Straight Arrow Connector 17">
+            <a:extLst>
+              <a:ext uri="{FF2B5EF4-FFF2-40B4-BE49-F238E27FC236}">
+                <a16:creationId xmlns:a16="http://schemas.microsoft.com/office/drawing/2014/main" id="{C9AA0F36-CE46-CA4F-9FFD-5E5935A12DE0}"/>
+              </a:ext>
+            </a:extLst>
+          </p:cNvPr>
+          <p:cNvCxnSpPr>
+            <a:cxnSpLocks/>
+          </p:cNvCxnSpPr>
+          <p:nvPr/>
+        </p:nvCxnSpPr>
+        <p:spPr>
+          <a:xfrm flipV="1">
+            <a:off x="4011793" y="7078941"/>
+            <a:ext cx="3600000" cy="1"/>
+          </a:xfrm>
+          <a:prstGeom prst="straightConnector1">
+            <a:avLst/>
+          </a:prstGeom>
+          <a:ln w="38100">
+            <a:solidFill>
+              <a:schemeClr val="tx1"/>
+            </a:solidFill>
+            <a:headEnd type="triangle"/>
+            <a:tailEnd type="triangle"/>
+          </a:ln>
+        </p:spPr>
+        <p:style>
+          <a:lnRef idx="1">
+            <a:schemeClr val="accent1"/>
+          </a:lnRef>
+          <a:fillRef idx="0">
+            <a:schemeClr val="accent1"/>
+          </a:fillRef>
+          <a:effectRef idx="0">
+            <a:schemeClr val="accent1"/>
+          </a:effectRef>
+          <a:fontRef idx="minor">
+            <a:schemeClr val="tx1"/>
+          </a:fontRef>
+        </p:style>
+      </p:cxnSp>
+      <p:cxnSp>
+        <p:nvCxnSpPr>
+          <p:cNvPr id="20" name="Straight Connector 19">
+            <a:extLst>
+              <a:ext uri="{FF2B5EF4-FFF2-40B4-BE49-F238E27FC236}">
+                <a16:creationId xmlns:a16="http://schemas.microsoft.com/office/drawing/2014/main" id="{ADF4931F-9A99-294E-863D-E28F329381B8}"/>
+              </a:ext>
+            </a:extLst>
+          </p:cNvPr>
+          <p:cNvCxnSpPr>
+            <a:cxnSpLocks/>
+          </p:cNvCxnSpPr>
+          <p:nvPr/>
+        </p:nvCxnSpPr>
+        <p:spPr>
+          <a:xfrm flipV="1">
+            <a:off x="3291793" y="2906316"/>
+            <a:ext cx="0" cy="4491435"/>
+          </a:xfrm>
+          <a:prstGeom prst="line">
+            <a:avLst/>
+          </a:prstGeom>
+          <a:ln w="28575">
+            <a:solidFill>
+              <a:schemeClr val="bg1">
+                <a:lumMod val="50000"/>
+              </a:schemeClr>
+            </a:solidFill>
+            <a:prstDash val="sysDot"/>
+          </a:ln>
+        </p:spPr>
+        <p:style>
+          <a:lnRef idx="1">
+            <a:schemeClr val="accent1"/>
+          </a:lnRef>
+          <a:fillRef idx="0">
+            <a:schemeClr val="accent1"/>
+          </a:fillRef>
+          <a:effectRef idx="0">
+            <a:schemeClr val="accent1"/>
+          </a:effectRef>
+          <a:fontRef idx="minor">
+            <a:schemeClr val="tx1"/>
+          </a:fontRef>
+        </p:style>
+      </p:cxnSp>
+      <p:sp>
+        <p:nvSpPr>
+          <p:cNvPr id="21" name="TextBox 20">
+            <a:extLst>
+              <a:ext uri="{FF2B5EF4-FFF2-40B4-BE49-F238E27FC236}">
+                <a16:creationId xmlns:a16="http://schemas.microsoft.com/office/drawing/2014/main" id="{D9962D59-4A20-7D4D-ABE8-74A7B943C223}"/>
+              </a:ext>
+            </a:extLst>
+          </p:cNvPr>
+          <p:cNvSpPr txBox="1"/>
+          <p:nvPr/>
+        </p:nvSpPr>
+        <p:spPr>
+          <a:xfrm>
+            <a:off x="5305957" y="6956059"/>
+            <a:ext cx="893193" cy="369332"/>
+          </a:xfrm>
+          <a:prstGeom prst="rect">
+            <a:avLst/>
+          </a:prstGeom>
+          <a:solidFill>
+            <a:schemeClr val="bg1"/>
+          </a:solidFill>
+        </p:spPr>
+        <p:txBody>
+          <a:bodyPr wrap="none" rtlCol="0">
+            <a:spAutoFit/>
+          </a:bodyPr>
+          <a:lstStyle/>
+          <a:p>
+            <a:r>
+              <a:rPr lang="en-US" dirty="0"/>
+              <a:t>10 mm </a:t>
+            </a:r>
+          </a:p>
+        </p:txBody>
+      </p:sp>
+      <p:cxnSp>
+        <p:nvCxnSpPr>
+          <p:cNvPr id="26" name="Straight Arrow Connector 25">
+            <a:extLst>
+              <a:ext uri="{FF2B5EF4-FFF2-40B4-BE49-F238E27FC236}">
+                <a16:creationId xmlns:a16="http://schemas.microsoft.com/office/drawing/2014/main" id="{6EC68862-4573-1B41-AD71-0902EBF018D7}"/>
+              </a:ext>
+            </a:extLst>
+          </p:cNvPr>
+          <p:cNvCxnSpPr>
+            <a:cxnSpLocks/>
+          </p:cNvCxnSpPr>
+          <p:nvPr/>
+        </p:nvCxnSpPr>
+        <p:spPr>
+          <a:xfrm flipV="1">
+            <a:off x="3291793" y="7320037"/>
+            <a:ext cx="5040000" cy="1"/>
+          </a:xfrm>
+          <a:prstGeom prst="straightConnector1">
+            <a:avLst/>
+          </a:prstGeom>
+          <a:ln w="38100">
+            <a:solidFill>
+              <a:schemeClr val="tx1"/>
+            </a:solidFill>
+            <a:headEnd type="triangle"/>
+            <a:tailEnd type="triangle"/>
+          </a:ln>
+        </p:spPr>
+        <p:style>
+          <a:lnRef idx="1">
+            <a:schemeClr val="accent1"/>
+          </a:lnRef>
+          <a:fillRef idx="0">
+            <a:schemeClr val="accent1"/>
+          </a:fillRef>
+          <a:effectRef idx="0">
+            <a:schemeClr val="accent1"/>
+          </a:effectRef>
+          <a:fontRef idx="minor">
+            <a:schemeClr val="tx1"/>
+          </a:fontRef>
+        </p:style>
+      </p:cxnSp>
+      <p:sp>
+        <p:nvSpPr>
+          <p:cNvPr id="31" name="TextBox 30">
+            <a:extLst>
+              <a:ext uri="{FF2B5EF4-FFF2-40B4-BE49-F238E27FC236}">
+                <a16:creationId xmlns:a16="http://schemas.microsoft.com/office/drawing/2014/main" id="{16B46A75-88C2-B748-932E-76CE6BE8387E}"/>
+              </a:ext>
+            </a:extLst>
+          </p:cNvPr>
+          <p:cNvSpPr txBox="1"/>
+          <p:nvPr/>
+        </p:nvSpPr>
+        <p:spPr>
+          <a:xfrm>
+            <a:off x="6633106" y="7135370"/>
+            <a:ext cx="893193" cy="369332"/>
+          </a:xfrm>
+          <a:prstGeom prst="rect">
+            <a:avLst/>
+          </a:prstGeom>
+          <a:solidFill>
+            <a:schemeClr val="bg1"/>
+          </a:solidFill>
+        </p:spPr>
+        <p:txBody>
+          <a:bodyPr wrap="none" rtlCol="0">
+            <a:spAutoFit/>
+          </a:bodyPr>
+          <a:lstStyle/>
+          <a:p>
+            <a:r>
+              <a:rPr lang="en-US" dirty="0"/>
+              <a:t>14 mm </a:t>
+            </a:r>
+          </a:p>
+        </p:txBody>
+      </p:sp>
+      <p:sp>
+        <p:nvSpPr>
+          <p:cNvPr id="32" name="TextBox 31">
+            <a:extLst>
+              <a:ext uri="{FF2B5EF4-FFF2-40B4-BE49-F238E27FC236}">
+                <a16:creationId xmlns:a16="http://schemas.microsoft.com/office/drawing/2014/main" id="{E4B25379-E43C-9445-886E-9EE5175291FB}"/>
+              </a:ext>
+            </a:extLst>
+          </p:cNvPr>
+          <p:cNvSpPr txBox="1"/>
+          <p:nvPr/>
+        </p:nvSpPr>
+        <p:spPr>
+          <a:xfrm>
+            <a:off x="5513705" y="3180477"/>
+            <a:ext cx="776175" cy="369332"/>
+          </a:xfrm>
+          <a:prstGeom prst="rect">
+            <a:avLst/>
+          </a:prstGeom>
+          <a:solidFill>
+            <a:schemeClr val="bg1"/>
+          </a:solidFill>
+        </p:spPr>
+        <p:txBody>
+          <a:bodyPr wrap="none" rtlCol="0">
+            <a:spAutoFit/>
+          </a:bodyPr>
+          <a:lstStyle/>
+          <a:p>
+            <a:r>
+              <a:rPr lang="en-US" dirty="0"/>
+              <a:t>1 mm </a:t>
+            </a:r>
+          </a:p>
+        </p:txBody>
+      </p:sp>
+      <p:cxnSp>
+        <p:nvCxnSpPr>
+          <p:cNvPr id="33" name="Straight Arrow Connector 32">
+            <a:extLst>
+              <a:ext uri="{FF2B5EF4-FFF2-40B4-BE49-F238E27FC236}">
+                <a16:creationId xmlns:a16="http://schemas.microsoft.com/office/drawing/2014/main" id="{DC9E1FCA-3424-6C47-9A56-AEA69A01F51D}"/>
+              </a:ext>
+            </a:extLst>
+          </p:cNvPr>
+          <p:cNvCxnSpPr/>
+          <p:nvPr/>
+        </p:nvCxnSpPr>
+        <p:spPr>
+          <a:xfrm>
+            <a:off x="5671385" y="3642141"/>
+            <a:ext cx="410409" cy="0"/>
+          </a:xfrm>
+          <a:prstGeom prst="straightConnector1">
+            <a:avLst/>
+          </a:prstGeom>
+          <a:ln w="38100">
+            <a:solidFill>
+              <a:schemeClr val="tx1"/>
+            </a:solidFill>
+            <a:headEnd type="triangle"/>
+            <a:tailEnd type="triangle"/>
+          </a:ln>
+        </p:spPr>
+        <p:style>
+          <a:lnRef idx="1">
+            <a:schemeClr val="accent1"/>
+          </a:lnRef>
+          <a:fillRef idx="0">
+            <a:schemeClr val="accent1"/>
+          </a:fillRef>
+          <a:effectRef idx="0">
+            <a:schemeClr val="accent1"/>
+          </a:effectRef>
+          <a:fontRef idx="minor">
+            <a:schemeClr val="tx1"/>
+          </a:fontRef>
+        </p:style>
+      </p:cxnSp>
+      <p:cxnSp>
+        <p:nvCxnSpPr>
+          <p:cNvPr id="34" name="Straight Connector 33">
+            <a:extLst>
+              <a:ext uri="{FF2B5EF4-FFF2-40B4-BE49-F238E27FC236}">
+                <a16:creationId xmlns:a16="http://schemas.microsoft.com/office/drawing/2014/main" id="{137186B1-32F9-2A40-8370-36A0FFFEDB01}"/>
+              </a:ext>
+            </a:extLst>
+          </p:cNvPr>
+          <p:cNvCxnSpPr>
+            <a:cxnSpLocks/>
+          </p:cNvCxnSpPr>
+          <p:nvPr/>
+        </p:nvCxnSpPr>
+        <p:spPr>
+          <a:xfrm>
+            <a:off x="2842054" y="2996314"/>
+            <a:ext cx="5906530" cy="0"/>
+          </a:xfrm>
+          <a:prstGeom prst="line">
+            <a:avLst/>
+          </a:prstGeom>
+          <a:ln w="28575">
+            <a:solidFill>
+              <a:schemeClr val="bg1"/>
+            </a:solidFill>
+            <a:prstDash val="sysDot"/>
+          </a:ln>
+        </p:spPr>
+        <p:style>
+          <a:lnRef idx="1">
+            <a:schemeClr val="accent1"/>
+          </a:lnRef>
+          <a:fillRef idx="0">
+            <a:schemeClr val="accent1"/>
+          </a:fillRef>
+          <a:effectRef idx="0">
+            <a:schemeClr val="accent1"/>
+          </a:effectRef>
+          <a:fontRef idx="minor">
+            <a:schemeClr val="tx1"/>
+          </a:fontRef>
+        </p:style>
+      </p:cxnSp>
+      <p:cxnSp>
+        <p:nvCxnSpPr>
+          <p:cNvPr id="37" name="Straight Arrow Connector 36">
+            <a:extLst>
+              <a:ext uri="{FF2B5EF4-FFF2-40B4-BE49-F238E27FC236}">
+                <a16:creationId xmlns:a16="http://schemas.microsoft.com/office/drawing/2014/main" id="{79D51DF2-92D2-FD46-97EB-722728C935C2}"/>
+              </a:ext>
+            </a:extLst>
+          </p:cNvPr>
+          <p:cNvCxnSpPr>
+            <a:cxnSpLocks/>
+          </p:cNvCxnSpPr>
+          <p:nvPr/>
+        </p:nvCxnSpPr>
+        <p:spPr>
+          <a:xfrm>
+            <a:off x="8556757" y="2823908"/>
+            <a:ext cx="0" cy="172725"/>
+          </a:xfrm>
+          <a:prstGeom prst="straightConnector1">
+            <a:avLst/>
+          </a:prstGeom>
+          <a:ln w="3175">
+            <a:solidFill>
+              <a:schemeClr val="bg1"/>
+            </a:solidFill>
+            <a:headEnd type="triangle"/>
+            <a:tailEnd type="triangle"/>
+          </a:ln>
+        </p:spPr>
+        <p:style>
+          <a:lnRef idx="1">
+            <a:schemeClr val="accent1"/>
+          </a:lnRef>
+          <a:fillRef idx="0">
+            <a:schemeClr val="accent1"/>
+          </a:fillRef>
+          <a:effectRef idx="0">
+            <a:schemeClr val="accent1"/>
+          </a:effectRef>
+          <a:fontRef idx="minor">
+            <a:schemeClr val="tx1"/>
+          </a:fontRef>
+        </p:style>
+      </p:cxnSp>
+      <p:sp>
+        <p:nvSpPr>
+          <p:cNvPr id="38" name="TextBox 37">
+            <a:extLst>
+              <a:ext uri="{FF2B5EF4-FFF2-40B4-BE49-F238E27FC236}">
+                <a16:creationId xmlns:a16="http://schemas.microsoft.com/office/drawing/2014/main" id="{C5D58491-0FAB-1842-8E1F-84EC468C5990}"/>
+              </a:ext>
+            </a:extLst>
+          </p:cNvPr>
+          <p:cNvSpPr txBox="1"/>
+          <p:nvPr/>
+        </p:nvSpPr>
+        <p:spPr>
+          <a:xfrm>
+            <a:off x="8593828" y="2750446"/>
+            <a:ext cx="950901" cy="369332"/>
+          </a:xfrm>
+          <a:prstGeom prst="rect">
+            <a:avLst/>
+          </a:prstGeom>
+          <a:noFill/>
+        </p:spPr>
+        <p:txBody>
+          <a:bodyPr wrap="none" rtlCol="0">
+            <a:spAutoFit/>
+          </a:bodyPr>
+          <a:lstStyle/>
+          <a:p>
+            <a:r>
+              <a:rPr lang="en-US" dirty="0">
+                <a:solidFill>
+                  <a:schemeClr val="bg1"/>
+                </a:solidFill>
+              </a:rPr>
+              <a:t>0.5 mm </a:t>
+            </a:r>
+          </a:p>
+        </p:txBody>
+      </p:sp>
+      <p:sp>
+        <p:nvSpPr>
+          <p:cNvPr id="39" name="TextBox 38">
+            <a:extLst>
+              <a:ext uri="{FF2B5EF4-FFF2-40B4-BE49-F238E27FC236}">
+                <a16:creationId xmlns:a16="http://schemas.microsoft.com/office/drawing/2014/main" id="{3EBF8D7D-DEA0-5F49-9C32-2DDB345A326A}"/>
+              </a:ext>
+            </a:extLst>
+          </p:cNvPr>
+          <p:cNvSpPr txBox="1"/>
+          <p:nvPr/>
+        </p:nvSpPr>
+        <p:spPr>
+          <a:xfrm>
+            <a:off x="3388929" y="3340455"/>
+            <a:ext cx="776175" cy="369332"/>
+          </a:xfrm>
+          <a:prstGeom prst="rect">
+            <a:avLst/>
+          </a:prstGeom>
+          <a:noFill/>
+        </p:spPr>
+        <p:txBody>
+          <a:bodyPr wrap="none" rtlCol="0">
+            <a:spAutoFit/>
+          </a:bodyPr>
+          <a:lstStyle/>
+          <a:p>
+            <a:r>
+              <a:rPr lang="en-US" dirty="0">
+                <a:solidFill>
+                  <a:schemeClr val="bg1"/>
+                </a:solidFill>
+              </a:rPr>
+              <a:t>3 mm </a:t>
+            </a:r>
+          </a:p>
+        </p:txBody>
+      </p:sp>
+      <p:cxnSp>
+        <p:nvCxnSpPr>
+          <p:cNvPr id="40" name="Straight Arrow Connector 39">
+            <a:extLst>
+              <a:ext uri="{FF2B5EF4-FFF2-40B4-BE49-F238E27FC236}">
+                <a16:creationId xmlns:a16="http://schemas.microsoft.com/office/drawing/2014/main" id="{58A28B5C-FEAA-1548-9D9B-74D171CEDE5A}"/>
+              </a:ext>
+            </a:extLst>
+          </p:cNvPr>
+          <p:cNvCxnSpPr>
+            <a:cxnSpLocks/>
+          </p:cNvCxnSpPr>
+          <p:nvPr/>
+        </p:nvCxnSpPr>
+        <p:spPr>
+          <a:xfrm>
+            <a:off x="3388928" y="2996314"/>
+            <a:ext cx="0" cy="1080000"/>
+          </a:xfrm>
+          <a:prstGeom prst="straightConnector1">
+            <a:avLst/>
+          </a:prstGeom>
+          <a:ln w="38100">
+            <a:solidFill>
+              <a:schemeClr val="bg1"/>
+            </a:solidFill>
+            <a:headEnd type="triangle"/>
+            <a:tailEnd type="triangle"/>
+          </a:ln>
+        </p:spPr>
+        <p:style>
+          <a:lnRef idx="1">
+            <a:schemeClr val="accent1"/>
+          </a:lnRef>
+          <a:fillRef idx="0">
+            <a:schemeClr val="accent1"/>
+          </a:fillRef>
+          <a:effectRef idx="0">
+            <a:schemeClr val="accent1"/>
+          </a:effectRef>
+          <a:fontRef idx="minor">
+            <a:schemeClr val="tx1"/>
+          </a:fontRef>
+        </p:style>
+      </p:cxnSp>
+      <p:sp>
+        <p:nvSpPr>
+          <p:cNvPr id="43" name="TextBox 42">
+            <a:extLst>
+              <a:ext uri="{FF2B5EF4-FFF2-40B4-BE49-F238E27FC236}">
+                <a16:creationId xmlns:a16="http://schemas.microsoft.com/office/drawing/2014/main" id="{F78BAEF1-35DE-B24D-93EE-B9A167E1E0D9}"/>
+              </a:ext>
+            </a:extLst>
+          </p:cNvPr>
+          <p:cNvSpPr txBox="1"/>
+          <p:nvPr/>
+        </p:nvSpPr>
+        <p:spPr>
+          <a:xfrm>
+            <a:off x="2342724" y="1186982"/>
+            <a:ext cx="776175" cy="369332"/>
+          </a:xfrm>
+          <a:prstGeom prst="rect">
+            <a:avLst/>
+          </a:prstGeom>
+          <a:noFill/>
+        </p:spPr>
+        <p:txBody>
+          <a:bodyPr wrap="none" rtlCol="0">
+            <a:spAutoFit/>
+          </a:bodyPr>
+          <a:lstStyle/>
+          <a:p>
+            <a:r>
+              <a:rPr lang="en-US" dirty="0">
+                <a:solidFill>
+                  <a:schemeClr val="bg1"/>
+                </a:solidFill>
+              </a:rPr>
+              <a:t>3 mm </a:t>
+            </a:r>
+          </a:p>
+        </p:txBody>
+      </p:sp>
+      <p:cxnSp>
+        <p:nvCxnSpPr>
+          <p:cNvPr id="44" name="Straight Arrow Connector 43">
+            <a:extLst>
+              <a:ext uri="{FF2B5EF4-FFF2-40B4-BE49-F238E27FC236}">
+                <a16:creationId xmlns:a16="http://schemas.microsoft.com/office/drawing/2014/main" id="{ACFB104F-AF50-124A-AB51-4D3F2835C8B9}"/>
+              </a:ext>
+            </a:extLst>
+          </p:cNvPr>
+          <p:cNvCxnSpPr>
+            <a:cxnSpLocks/>
+          </p:cNvCxnSpPr>
+          <p:nvPr/>
+        </p:nvCxnSpPr>
+        <p:spPr>
+          <a:xfrm>
+            <a:off x="2342723" y="842841"/>
+            <a:ext cx="0" cy="1080000"/>
+          </a:xfrm>
+          <a:prstGeom prst="straightConnector1">
+            <a:avLst/>
+          </a:prstGeom>
+          <a:ln w="38100">
+            <a:solidFill>
+              <a:schemeClr val="bg1"/>
+            </a:solidFill>
+            <a:headEnd type="triangle"/>
+            <a:tailEnd type="triangle"/>
+          </a:ln>
+        </p:spPr>
+        <p:style>
+          <a:lnRef idx="1">
+            <a:schemeClr val="accent1"/>
+          </a:lnRef>
+          <a:fillRef idx="0">
+            <a:schemeClr val="accent1"/>
+          </a:fillRef>
+          <a:effectRef idx="0">
+            <a:schemeClr val="accent1"/>
+          </a:effectRef>
+          <a:fontRef idx="minor">
+            <a:schemeClr val="tx1"/>
+          </a:fontRef>
+        </p:style>
+      </p:cxnSp>
+      <p:cxnSp>
+        <p:nvCxnSpPr>
+          <p:cNvPr id="46" name="Straight Arrow Connector 45">
+            <a:extLst>
+              <a:ext uri="{FF2B5EF4-FFF2-40B4-BE49-F238E27FC236}">
+                <a16:creationId xmlns:a16="http://schemas.microsoft.com/office/drawing/2014/main" id="{21D45FB0-EFF5-064F-A476-BC51A4409D87}"/>
+              </a:ext>
+            </a:extLst>
+          </p:cNvPr>
+          <p:cNvCxnSpPr>
+            <a:cxnSpLocks/>
+          </p:cNvCxnSpPr>
+          <p:nvPr/>
+        </p:nvCxnSpPr>
+        <p:spPr>
+          <a:xfrm>
+            <a:off x="3625841" y="1923907"/>
+            <a:ext cx="0" cy="900000"/>
+          </a:xfrm>
+          <a:prstGeom prst="straightConnector1">
+            <a:avLst/>
+          </a:prstGeom>
+          <a:ln w="38100">
+            <a:solidFill>
+              <a:schemeClr val="tx1"/>
+            </a:solidFill>
+            <a:headEnd type="triangle"/>
+            <a:tailEnd type="triangle"/>
+          </a:ln>
+        </p:spPr>
+        <p:style>
+          <a:lnRef idx="1">
+            <a:schemeClr val="accent1"/>
+          </a:lnRef>
+          <a:fillRef idx="0">
+            <a:schemeClr val="accent1"/>
+          </a:fillRef>
+          <a:effectRef idx="0">
+            <a:schemeClr val="accent1"/>
+          </a:effectRef>
+          <a:fontRef idx="minor">
+            <a:schemeClr val="tx1"/>
+          </a:fontRef>
+        </p:style>
+      </p:cxnSp>
+      <p:cxnSp>
+        <p:nvCxnSpPr>
+          <p:cNvPr id="48" name="Straight Arrow Connector 47">
+            <a:extLst>
+              <a:ext uri="{FF2B5EF4-FFF2-40B4-BE49-F238E27FC236}">
+                <a16:creationId xmlns:a16="http://schemas.microsoft.com/office/drawing/2014/main" id="{452B12CA-C0BB-BF41-B061-AE8C005341DA}"/>
+              </a:ext>
+            </a:extLst>
+          </p:cNvPr>
+          <p:cNvCxnSpPr>
+            <a:cxnSpLocks/>
+          </p:cNvCxnSpPr>
+          <p:nvPr/>
+        </p:nvCxnSpPr>
+        <p:spPr>
+          <a:xfrm flipV="1">
+            <a:off x="1131793" y="2494401"/>
+            <a:ext cx="9363836" cy="33450"/>
+          </a:xfrm>
+          <a:prstGeom prst="straightConnector1">
+            <a:avLst/>
+          </a:prstGeom>
+          <a:ln w="38100">
+            <a:solidFill>
+              <a:schemeClr val="tx1"/>
+            </a:solidFill>
+            <a:headEnd type="triangle"/>
+            <a:tailEnd type="triangle"/>
+          </a:ln>
+        </p:spPr>
+        <p:style>
+          <a:lnRef idx="1">
+            <a:schemeClr val="accent1"/>
+          </a:lnRef>
+          <a:fillRef idx="0">
+            <a:schemeClr val="accent1"/>
+          </a:fillRef>
+          <a:effectRef idx="0">
+            <a:schemeClr val="accent1"/>
+          </a:effectRef>
+          <a:fontRef idx="minor">
+            <a:schemeClr val="tx1"/>
+          </a:fontRef>
+        </p:style>
+      </p:cxnSp>
+      <p:sp>
+        <p:nvSpPr>
+          <p:cNvPr id="50" name="TextBox 49">
+            <a:extLst>
+              <a:ext uri="{FF2B5EF4-FFF2-40B4-BE49-F238E27FC236}">
+                <a16:creationId xmlns:a16="http://schemas.microsoft.com/office/drawing/2014/main" id="{F4B3C3BE-3750-A841-AF37-A32C1415EAEB}"/>
+              </a:ext>
+            </a:extLst>
+          </p:cNvPr>
+          <p:cNvSpPr txBox="1"/>
+          <p:nvPr/>
+        </p:nvSpPr>
+        <p:spPr>
+          <a:xfrm>
+            <a:off x="5455195" y="2258093"/>
+            <a:ext cx="893193" cy="369332"/>
+          </a:xfrm>
+          <a:prstGeom prst="rect">
+            <a:avLst/>
+          </a:prstGeom>
+          <a:solidFill>
+            <a:schemeClr val="bg2"/>
+          </a:solidFill>
+        </p:spPr>
+        <p:txBody>
+          <a:bodyPr wrap="none" rtlCol="0">
+            <a:spAutoFit/>
+          </a:bodyPr>
+          <a:lstStyle/>
+          <a:p>
+            <a:r>
+              <a:rPr lang="en-US" dirty="0"/>
+              <a:t>26 mm </a:t>
+            </a:r>
+          </a:p>
+        </p:txBody>
+      </p:sp>
+      <p:sp>
+        <p:nvSpPr>
+          <p:cNvPr id="45" name="TextBox 44">
+            <a:extLst>
+              <a:ext uri="{FF2B5EF4-FFF2-40B4-BE49-F238E27FC236}">
+                <a16:creationId xmlns:a16="http://schemas.microsoft.com/office/drawing/2014/main" id="{73C49387-9E12-B447-86C1-866230C8C95A}"/>
+              </a:ext>
+            </a:extLst>
+          </p:cNvPr>
+          <p:cNvSpPr txBox="1"/>
+          <p:nvPr/>
+        </p:nvSpPr>
+        <p:spPr>
+          <a:xfrm>
+            <a:off x="3589618" y="2124752"/>
+            <a:ext cx="950901" cy="369332"/>
+          </a:xfrm>
+          <a:prstGeom prst="rect">
+            <a:avLst/>
+          </a:prstGeom>
+          <a:noFill/>
+        </p:spPr>
+        <p:txBody>
+          <a:bodyPr wrap="none" rtlCol="0">
+            <a:spAutoFit/>
+          </a:bodyPr>
+          <a:lstStyle/>
+          <a:p>
+            <a:r>
+              <a:rPr lang="en-US" dirty="0"/>
+              <a:t>2.5 mm </a:t>
+            </a:r>
+          </a:p>
+        </p:txBody>
+      </p:sp>
+      <p:sp>
+        <p:nvSpPr>
+          <p:cNvPr id="51" name="TextBox 50">
+            <a:extLst>
+              <a:ext uri="{FF2B5EF4-FFF2-40B4-BE49-F238E27FC236}">
+                <a16:creationId xmlns:a16="http://schemas.microsoft.com/office/drawing/2014/main" id="{9EE23F80-718F-F440-A35E-4CAE439761AE}"/>
+              </a:ext>
+            </a:extLst>
+          </p:cNvPr>
+          <p:cNvSpPr txBox="1"/>
+          <p:nvPr/>
+        </p:nvSpPr>
+        <p:spPr>
+          <a:xfrm>
+            <a:off x="54937" y="6771393"/>
+            <a:ext cx="2898044" cy="369332"/>
+          </a:xfrm>
+          <a:prstGeom prst="rect">
+            <a:avLst/>
+          </a:prstGeom>
+          <a:noFill/>
+        </p:spPr>
+        <p:txBody>
+          <a:bodyPr wrap="square" rtlCol="0">
+            <a:spAutoFit/>
+          </a:bodyPr>
+          <a:lstStyle/>
+          <a:p>
+            <a:r>
+              <a:rPr lang="en-US" dirty="0"/>
+              <a:t>Drawing to scale</a:t>
+            </a:r>
+          </a:p>
+        </p:txBody>
+      </p:sp>
+      <p:sp>
+        <p:nvSpPr>
+          <p:cNvPr id="52" name="TextBox 51">
+            <a:extLst>
+              <a:ext uri="{FF2B5EF4-FFF2-40B4-BE49-F238E27FC236}">
+                <a16:creationId xmlns:a16="http://schemas.microsoft.com/office/drawing/2014/main" id="{4A55A2FF-FC1E-534E-AEC6-63B4DB076573}"/>
+              </a:ext>
+            </a:extLst>
+          </p:cNvPr>
+          <p:cNvSpPr txBox="1"/>
+          <p:nvPr/>
+        </p:nvSpPr>
+        <p:spPr>
+          <a:xfrm>
+            <a:off x="-5748" y="4603299"/>
+            <a:ext cx="3257503" cy="1877437"/>
+          </a:xfrm>
+          <a:prstGeom prst="rect">
+            <a:avLst/>
+          </a:prstGeom>
+          <a:solidFill>
+            <a:srgbClr val="FFFF00"/>
+          </a:solidFill>
+          <a:ln>
+            <a:solidFill>
+              <a:schemeClr val="tx1"/>
+            </a:solidFill>
+          </a:ln>
+        </p:spPr>
+        <p:txBody>
+          <a:bodyPr wrap="square" rtlCol="0">
+            <a:spAutoFit/>
+          </a:bodyPr>
+          <a:lstStyle/>
+          <a:p>
+            <a:r>
+              <a:rPr lang="en-US" sz="2800" dirty="0"/>
+              <a:t>Collimator Dimensions</a:t>
+            </a:r>
+          </a:p>
+          <a:p>
+            <a:r>
+              <a:rPr lang="en-US" sz="2000" dirty="0"/>
+              <a:t>Corresponds to: ~/CAGE/sims/geometries/</a:t>
+            </a:r>
+            <a:r>
+              <a:rPr lang="en-US" sz="2000" dirty="0" err="1"/>
+              <a:t>Am_collimator_new.gdml</a:t>
+            </a:r>
+            <a:endParaRPr lang="en-US" sz="2000" dirty="0"/>
+          </a:p>
+        </p:txBody>
+      </p:sp>
+      <p:sp>
+        <p:nvSpPr>
+          <p:cNvPr id="53" name="TextBox 52">
+            <a:extLst>
+              <a:ext uri="{FF2B5EF4-FFF2-40B4-BE49-F238E27FC236}">
+                <a16:creationId xmlns:a16="http://schemas.microsoft.com/office/drawing/2014/main" id="{D0967052-E194-D34D-B12F-F48DA3A05BEA}"/>
+              </a:ext>
+            </a:extLst>
+          </p:cNvPr>
+          <p:cNvSpPr txBox="1"/>
+          <p:nvPr/>
+        </p:nvSpPr>
+        <p:spPr>
+          <a:xfrm>
+            <a:off x="75522" y="7073870"/>
+            <a:ext cx="2968698" cy="307777"/>
+          </a:xfrm>
+          <a:prstGeom prst="rect">
+            <a:avLst/>
+          </a:prstGeom>
+          <a:noFill/>
+        </p:spPr>
+        <p:txBody>
+          <a:bodyPr wrap="none" rtlCol="0">
+            <a:spAutoFit/>
+          </a:bodyPr>
+          <a:lstStyle/>
+          <a:p>
+            <a:r>
+              <a:rPr lang="en-US" sz="1400" dirty="0"/>
+              <a:t>Scale: 1 mm real life = 1 cm in drawing</a:t>
+            </a:r>
+          </a:p>
+        </p:txBody>
+      </p:sp>
+      <p:cxnSp>
+        <p:nvCxnSpPr>
+          <p:cNvPr id="41" name="Straight Arrow Connector 40">
+            <a:extLst>
+              <a:ext uri="{FF2B5EF4-FFF2-40B4-BE49-F238E27FC236}">
+                <a16:creationId xmlns:a16="http://schemas.microsoft.com/office/drawing/2014/main" id="{AF0B0EEC-416A-2741-A494-A9E82B8C65B2}"/>
+              </a:ext>
+            </a:extLst>
+          </p:cNvPr>
+          <p:cNvCxnSpPr>
+            <a:cxnSpLocks/>
+          </p:cNvCxnSpPr>
+          <p:nvPr/>
+        </p:nvCxnSpPr>
+        <p:spPr>
+          <a:xfrm flipH="1">
+            <a:off x="51793" y="2273316"/>
+            <a:ext cx="1080000" cy="0"/>
+          </a:xfrm>
+          <a:prstGeom prst="straightConnector1">
+            <a:avLst/>
+          </a:prstGeom>
+          <a:ln w="38100">
+            <a:solidFill>
+              <a:schemeClr val="bg1"/>
+            </a:solidFill>
+            <a:headEnd type="triangle"/>
+            <a:tailEnd type="triangle"/>
+          </a:ln>
+        </p:spPr>
+        <p:style>
+          <a:lnRef idx="1">
+            <a:schemeClr val="accent1"/>
+          </a:lnRef>
+          <a:fillRef idx="0">
+            <a:schemeClr val="accent1"/>
+          </a:fillRef>
+          <a:effectRef idx="0">
+            <a:schemeClr val="accent1"/>
+          </a:effectRef>
+          <a:fontRef idx="minor">
+            <a:schemeClr val="tx1"/>
+          </a:fontRef>
+        </p:style>
+      </p:cxnSp>
+      <p:sp>
+        <p:nvSpPr>
+          <p:cNvPr id="42" name="TextBox 41">
+            <a:extLst>
+              <a:ext uri="{FF2B5EF4-FFF2-40B4-BE49-F238E27FC236}">
+                <a16:creationId xmlns:a16="http://schemas.microsoft.com/office/drawing/2014/main" id="{09F14992-14D4-B448-B8DC-18AEDB49AC7F}"/>
+              </a:ext>
+            </a:extLst>
+          </p:cNvPr>
+          <p:cNvSpPr txBox="1"/>
+          <p:nvPr/>
+        </p:nvSpPr>
+        <p:spPr>
+          <a:xfrm>
+            <a:off x="223909" y="2352143"/>
+            <a:ext cx="776175" cy="369332"/>
+          </a:xfrm>
+          <a:prstGeom prst="rect">
+            <a:avLst/>
+          </a:prstGeom>
+          <a:noFill/>
+        </p:spPr>
+        <p:txBody>
+          <a:bodyPr wrap="none" rtlCol="0">
+            <a:spAutoFit/>
+          </a:bodyPr>
+          <a:lstStyle/>
+          <a:p>
+            <a:r>
+              <a:rPr lang="en-US" dirty="0">
+                <a:solidFill>
+                  <a:schemeClr val="bg1"/>
+                </a:solidFill>
+              </a:rPr>
+              <a:t>3 mm </a:t>
+            </a:r>
+          </a:p>
+        </p:txBody>
+      </p:sp>
+      <p:sp>
+        <p:nvSpPr>
+          <p:cNvPr id="47" name="Oval 46">
+            <a:extLst>
+              <a:ext uri="{FF2B5EF4-FFF2-40B4-BE49-F238E27FC236}">
+                <a16:creationId xmlns:a16="http://schemas.microsoft.com/office/drawing/2014/main" id="{49422B86-1853-AC45-B682-A696BA431A4E}"/>
+              </a:ext>
+            </a:extLst>
+          </p:cNvPr>
+          <p:cNvSpPr/>
+          <p:nvPr/>
+        </p:nvSpPr>
+        <p:spPr>
+          <a:xfrm>
+            <a:off x="5277672" y="2924216"/>
+            <a:ext cx="1172368" cy="1015118"/>
+          </a:xfrm>
+          <a:prstGeom prst="ellipse">
+            <a:avLst/>
+          </a:prstGeom>
+          <a:noFill/>
+          <a:ln w="38100">
+            <a:solidFill>
+              <a:srgbClr val="FF0000"/>
+            </a:solidFill>
+            <a:prstDash val="sysDash"/>
+          </a:ln>
+        </p:spPr>
+        <p:style>
+          <a:lnRef idx="2">
+            <a:schemeClr val="accent1">
+              <a:shade val="50000"/>
+            </a:schemeClr>
+          </a:lnRef>
+          <a:fillRef idx="1">
+            <a:schemeClr val="accent1"/>
+          </a:fillRef>
+          <a:effectRef idx="0">
+            <a:schemeClr val="accent1"/>
+          </a:effectRef>
+          <a:fontRef idx="minor">
+            <a:schemeClr val="lt1"/>
+          </a:fontRef>
+        </p:style>
+        <p:txBody>
+          <a:bodyPr rtlCol="0" anchor="ctr"/>
+          <a:lstStyle/>
+          <a:p>
+            <a:pPr algn="ctr"/>
+            <a:endParaRPr lang="en-US"/>
+          </a:p>
+        </p:txBody>
+      </p:sp>
+      <p:sp>
+        <p:nvSpPr>
+          <p:cNvPr id="49" name="Oval 48">
+            <a:extLst>
+              <a:ext uri="{FF2B5EF4-FFF2-40B4-BE49-F238E27FC236}">
+                <a16:creationId xmlns:a16="http://schemas.microsoft.com/office/drawing/2014/main" id="{C856A1A0-0E01-CD4E-A69F-81F881094105}"/>
+              </a:ext>
+            </a:extLst>
+          </p:cNvPr>
+          <p:cNvSpPr/>
+          <p:nvPr/>
+        </p:nvSpPr>
+        <p:spPr>
+          <a:xfrm>
+            <a:off x="3190832" y="2992706"/>
+            <a:ext cx="1172368" cy="1015118"/>
+          </a:xfrm>
+          <a:prstGeom prst="ellipse">
+            <a:avLst/>
+          </a:prstGeom>
+          <a:noFill/>
+          <a:ln w="38100">
+            <a:solidFill>
+              <a:srgbClr val="FF0000"/>
+            </a:solidFill>
+            <a:prstDash val="sysDash"/>
+          </a:ln>
+        </p:spPr>
+        <p:style>
+          <a:lnRef idx="2">
+            <a:schemeClr val="accent1">
+              <a:shade val="50000"/>
+            </a:schemeClr>
+          </a:lnRef>
+          <a:fillRef idx="1">
+            <a:schemeClr val="accent1"/>
+          </a:fillRef>
+          <a:effectRef idx="0">
+            <a:schemeClr val="accent1"/>
+          </a:effectRef>
+          <a:fontRef idx="minor">
+            <a:schemeClr val="lt1"/>
+          </a:fontRef>
+        </p:style>
+        <p:txBody>
+          <a:bodyPr rtlCol="0" anchor="ctr"/>
+          <a:lstStyle/>
+          <a:p>
+            <a:pPr algn="ctr"/>
+            <a:endParaRPr lang="en-US"/>
+          </a:p>
+        </p:txBody>
+      </p:sp>
+      <p:sp>
+        <p:nvSpPr>
+          <p:cNvPr id="54" name="Oval 53">
+            <a:extLst>
+              <a:ext uri="{FF2B5EF4-FFF2-40B4-BE49-F238E27FC236}">
+                <a16:creationId xmlns:a16="http://schemas.microsoft.com/office/drawing/2014/main" id="{8E312DBB-A96A-D24F-8563-9B1B1FDE9373}"/>
+              </a:ext>
+            </a:extLst>
+          </p:cNvPr>
+          <p:cNvSpPr/>
+          <p:nvPr/>
+        </p:nvSpPr>
+        <p:spPr>
+          <a:xfrm>
+            <a:off x="0" y="2020292"/>
+            <a:ext cx="1172368" cy="1015118"/>
+          </a:xfrm>
+          <a:prstGeom prst="ellipse">
+            <a:avLst/>
+          </a:prstGeom>
+          <a:noFill/>
+          <a:ln w="38100">
+            <a:solidFill>
+              <a:srgbClr val="FF0000"/>
+            </a:solidFill>
+            <a:prstDash val="sysDash"/>
+          </a:ln>
+        </p:spPr>
+        <p:style>
+          <a:lnRef idx="2">
+            <a:schemeClr val="accent1">
+              <a:shade val="50000"/>
+            </a:schemeClr>
+          </a:lnRef>
+          <a:fillRef idx="1">
+            <a:schemeClr val="accent1"/>
+          </a:fillRef>
+          <a:effectRef idx="0">
+            <a:schemeClr val="accent1"/>
+          </a:effectRef>
+          <a:fontRef idx="minor">
+            <a:schemeClr val="lt1"/>
+          </a:fontRef>
+        </p:style>
+        <p:txBody>
+          <a:bodyPr rtlCol="0" anchor="ctr"/>
+          <a:lstStyle/>
+          <a:p>
+            <a:pPr algn="ctr"/>
+            <a:endParaRPr lang="en-US"/>
+          </a:p>
+        </p:txBody>
+      </p:sp>
+      <p:sp>
+        <p:nvSpPr>
+          <p:cNvPr id="55" name="Oval 54">
+            <a:extLst>
+              <a:ext uri="{FF2B5EF4-FFF2-40B4-BE49-F238E27FC236}">
+                <a16:creationId xmlns:a16="http://schemas.microsoft.com/office/drawing/2014/main" id="{57FC5D20-E07E-0B46-9AA0-695C57A0AA5F}"/>
+              </a:ext>
+            </a:extLst>
+          </p:cNvPr>
+          <p:cNvSpPr/>
+          <p:nvPr/>
+        </p:nvSpPr>
+        <p:spPr>
+          <a:xfrm>
+            <a:off x="1970007" y="850145"/>
+            <a:ext cx="1172368" cy="1015118"/>
+          </a:xfrm>
+          <a:prstGeom prst="ellipse">
+            <a:avLst/>
+          </a:prstGeom>
+          <a:noFill/>
+          <a:ln w="38100">
+            <a:solidFill>
+              <a:srgbClr val="FF0000"/>
+            </a:solidFill>
+            <a:prstDash val="sysDash"/>
+          </a:ln>
+        </p:spPr>
+        <p:style>
+          <a:lnRef idx="2">
+            <a:schemeClr val="accent1">
+              <a:shade val="50000"/>
+            </a:schemeClr>
+          </a:lnRef>
+          <a:fillRef idx="1">
+            <a:schemeClr val="accent1"/>
+          </a:fillRef>
+          <a:effectRef idx="0">
+            <a:schemeClr val="accent1"/>
+          </a:effectRef>
+          <a:fontRef idx="minor">
+            <a:schemeClr val="lt1"/>
+          </a:fontRef>
+        </p:style>
+        <p:txBody>
+          <a:bodyPr rtlCol="0" anchor="ctr"/>
+          <a:lstStyle/>
+          <a:p>
+            <a:pPr algn="ctr"/>
+            <a:endParaRPr lang="en-US"/>
+          </a:p>
+        </p:txBody>
+      </p:sp>
+      <p:sp>
+        <p:nvSpPr>
+          <p:cNvPr id="56" name="Oval 55">
+            <a:extLst>
+              <a:ext uri="{FF2B5EF4-FFF2-40B4-BE49-F238E27FC236}">
+                <a16:creationId xmlns:a16="http://schemas.microsoft.com/office/drawing/2014/main" id="{B1D28FF5-A311-C94C-BB12-F13E27732930}"/>
+              </a:ext>
+            </a:extLst>
+          </p:cNvPr>
+          <p:cNvSpPr/>
+          <p:nvPr/>
+        </p:nvSpPr>
+        <p:spPr>
+          <a:xfrm>
+            <a:off x="5244890" y="216039"/>
+            <a:ext cx="1172368" cy="1015118"/>
+          </a:xfrm>
+          <a:prstGeom prst="ellipse">
+            <a:avLst/>
+          </a:prstGeom>
+          <a:noFill/>
+          <a:ln w="38100">
+            <a:solidFill>
+              <a:srgbClr val="FF0000"/>
+            </a:solidFill>
+            <a:prstDash val="sysDash"/>
+          </a:ln>
+        </p:spPr>
+        <p:style>
+          <a:lnRef idx="2">
+            <a:schemeClr val="accent1">
+              <a:shade val="50000"/>
+            </a:schemeClr>
+          </a:lnRef>
+          <a:fillRef idx="1">
+            <a:schemeClr val="accent1"/>
+          </a:fillRef>
+          <a:effectRef idx="0">
+            <a:schemeClr val="accent1"/>
+          </a:effectRef>
+          <a:fontRef idx="minor">
+            <a:schemeClr val="lt1"/>
+          </a:fontRef>
+        </p:style>
+        <p:txBody>
+          <a:bodyPr rtlCol="0" anchor="ctr"/>
+          <a:lstStyle/>
+          <a:p>
+            <a:pPr algn="ctr"/>
+            <a:endParaRPr lang="en-US"/>
+          </a:p>
+        </p:txBody>
+      </p:sp>
+      <p:sp>
+        <p:nvSpPr>
+          <p:cNvPr id="57" name="Oval 56">
+            <a:extLst>
+              <a:ext uri="{FF2B5EF4-FFF2-40B4-BE49-F238E27FC236}">
+                <a16:creationId xmlns:a16="http://schemas.microsoft.com/office/drawing/2014/main" id="{C909D019-031C-9C48-9658-5DE1A4349AB5}"/>
+              </a:ext>
+            </a:extLst>
+          </p:cNvPr>
+          <p:cNvSpPr/>
+          <p:nvPr/>
+        </p:nvSpPr>
+        <p:spPr>
+          <a:xfrm>
+            <a:off x="5131603" y="6566311"/>
+            <a:ext cx="1172368" cy="1015118"/>
+          </a:xfrm>
+          <a:prstGeom prst="ellipse">
+            <a:avLst/>
+          </a:prstGeom>
+          <a:noFill/>
+          <a:ln w="38100">
+            <a:solidFill>
+              <a:srgbClr val="FF0000"/>
+            </a:solidFill>
+            <a:prstDash val="sysDash"/>
+          </a:ln>
+        </p:spPr>
+        <p:style>
+          <a:lnRef idx="2">
+            <a:schemeClr val="accent1">
+              <a:shade val="50000"/>
+            </a:schemeClr>
+          </a:lnRef>
+          <a:fillRef idx="1">
+            <a:schemeClr val="accent1"/>
+          </a:fillRef>
+          <a:effectRef idx="0">
+            <a:schemeClr val="accent1"/>
+          </a:effectRef>
+          <a:fontRef idx="minor">
+            <a:schemeClr val="lt1"/>
+          </a:fontRef>
+        </p:style>
+        <p:txBody>
+          <a:bodyPr rtlCol="0" anchor="ctr"/>
+          <a:lstStyle/>
+          <a:p>
+            <a:pPr algn="ctr"/>
+            <a:endParaRPr lang="en-US"/>
+          </a:p>
+        </p:txBody>
+      </p:sp>
+      <p:cxnSp>
+        <p:nvCxnSpPr>
+          <p:cNvPr id="58" name="Straight Arrow Connector 57">
+            <a:extLst>
+              <a:ext uri="{FF2B5EF4-FFF2-40B4-BE49-F238E27FC236}">
+                <a16:creationId xmlns:a16="http://schemas.microsoft.com/office/drawing/2014/main" id="{248A61C0-0EDD-E549-85B0-86B37BDD6AFE}"/>
+              </a:ext>
+            </a:extLst>
+          </p:cNvPr>
+          <p:cNvCxnSpPr>
+            <a:cxnSpLocks/>
+          </p:cNvCxnSpPr>
+          <p:nvPr/>
+        </p:nvCxnSpPr>
+        <p:spPr>
+          <a:xfrm>
+            <a:off x="6843170" y="2816314"/>
+            <a:ext cx="0" cy="1620000"/>
+          </a:xfrm>
+          <a:prstGeom prst="straightConnector1">
+            <a:avLst/>
+          </a:prstGeom>
+          <a:ln w="38100">
+            <a:solidFill>
+              <a:srgbClr val="7030A0"/>
+            </a:solidFill>
+            <a:headEnd type="triangle"/>
+            <a:tailEnd type="triangle"/>
+          </a:ln>
+        </p:spPr>
+        <p:style>
+          <a:lnRef idx="1">
+            <a:schemeClr val="accent1"/>
+          </a:lnRef>
+          <a:fillRef idx="0">
+            <a:schemeClr val="accent1"/>
+          </a:fillRef>
+          <a:effectRef idx="0">
+            <a:schemeClr val="accent1"/>
+          </a:effectRef>
+          <a:fontRef idx="minor">
+            <a:schemeClr val="tx1"/>
+          </a:fontRef>
+        </p:style>
+      </p:cxnSp>
+      <p:cxnSp>
+        <p:nvCxnSpPr>
+          <p:cNvPr id="59" name="Straight Connector 58">
+            <a:extLst>
+              <a:ext uri="{FF2B5EF4-FFF2-40B4-BE49-F238E27FC236}">
+                <a16:creationId xmlns:a16="http://schemas.microsoft.com/office/drawing/2014/main" id="{B8104714-AAD4-8841-B142-44174B738B54}"/>
+              </a:ext>
+            </a:extLst>
+          </p:cNvPr>
+          <p:cNvCxnSpPr>
+            <a:cxnSpLocks/>
+          </p:cNvCxnSpPr>
+          <p:nvPr/>
+        </p:nvCxnSpPr>
+        <p:spPr>
+          <a:xfrm flipV="1">
+            <a:off x="3777016" y="4428009"/>
+            <a:ext cx="4438516" cy="7724"/>
+          </a:xfrm>
+          <a:prstGeom prst="line">
+            <a:avLst/>
+          </a:prstGeom>
+          <a:ln w="28575">
+            <a:solidFill>
+              <a:srgbClr val="00B0F0"/>
+            </a:solidFill>
+            <a:prstDash val="sysDot"/>
+          </a:ln>
+        </p:spPr>
+        <p:style>
+          <a:lnRef idx="1">
+            <a:schemeClr val="accent1"/>
+          </a:lnRef>
+          <a:fillRef idx="0">
+            <a:schemeClr val="accent1"/>
+          </a:fillRef>
+          <a:effectRef idx="0">
+            <a:schemeClr val="accent1"/>
+          </a:effectRef>
+          <a:fontRef idx="minor">
+            <a:schemeClr val="tx1"/>
+          </a:fontRef>
+        </p:style>
+      </p:cxnSp>
+      <p:grpSp>
+        <p:nvGrpSpPr>
+          <p:cNvPr id="60" name="Group 59">
+            <a:extLst>
+              <a:ext uri="{FF2B5EF4-FFF2-40B4-BE49-F238E27FC236}">
+                <a16:creationId xmlns:a16="http://schemas.microsoft.com/office/drawing/2014/main" id="{18353D08-E982-9C42-BDAF-F885A8D6CCCD}"/>
+              </a:ext>
+            </a:extLst>
+          </p:cNvPr>
+          <p:cNvGrpSpPr/>
+          <p:nvPr/>
+        </p:nvGrpSpPr>
+        <p:grpSpPr>
+          <a:xfrm>
+            <a:off x="5464370" y="4090384"/>
+            <a:ext cx="963090" cy="834519"/>
+            <a:chOff x="6013183" y="3318113"/>
+            <a:chExt cx="463550" cy="393700"/>
+          </a:xfrm>
+          <a:solidFill>
+            <a:srgbClr val="FF0000"/>
+          </a:solidFill>
+        </p:grpSpPr>
+        <p:sp>
+          <p:nvSpPr>
+            <p:cNvPr id="61" name="Oval 60">
+              <a:extLst>
+                <a:ext uri="{FF2B5EF4-FFF2-40B4-BE49-F238E27FC236}">
+                  <a16:creationId xmlns:a16="http://schemas.microsoft.com/office/drawing/2014/main" id="{CB21B8D1-023D-0940-BCF4-2E48737D82EE}"/>
+                </a:ext>
+              </a:extLst>
+            </p:cNvPr>
+            <p:cNvSpPr>
+              <a:spLocks noChangeAspect="1"/>
+            </p:cNvSpPr>
+            <p:nvPr/>
+          </p:nvSpPr>
+          <p:spPr>
+            <a:xfrm>
+              <a:off x="6178283" y="3433236"/>
+              <a:ext cx="91440" cy="91440"/>
+            </a:xfrm>
+            <a:prstGeom prst="ellipse">
+              <a:avLst/>
+            </a:prstGeom>
+            <a:grpFill/>
+            <a:ln w="25400">
+              <a:solidFill>
+                <a:srgbClr val="FF0000"/>
+              </a:solidFill>
+            </a:ln>
+          </p:spPr>
+          <p:style>
+            <a:lnRef idx="2">
+              <a:schemeClr val="accent1">
+                <a:shade val="50000"/>
+              </a:schemeClr>
+            </a:lnRef>
+            <a:fillRef idx="1">
+              <a:schemeClr val="accent1"/>
+            </a:fillRef>
+            <a:effectRef idx="0">
+              <a:schemeClr val="accent1"/>
+            </a:effectRef>
+            <a:fontRef idx="minor">
+              <a:schemeClr val="lt1"/>
+            </a:fontRef>
+          </p:style>
+          <p:txBody>
+            <a:bodyPr rtlCol="0" anchor="ctr"/>
+            <a:lstStyle/>
+            <a:p>
+              <a:pPr algn="ctr"/>
+              <a:endParaRPr lang="en-US"/>
+            </a:p>
+          </p:txBody>
+        </p:sp>
+        <p:cxnSp>
+          <p:nvCxnSpPr>
+            <p:cNvPr id="62" name="Straight Connector 61">
+              <a:extLst>
+                <a:ext uri="{FF2B5EF4-FFF2-40B4-BE49-F238E27FC236}">
+                  <a16:creationId xmlns:a16="http://schemas.microsoft.com/office/drawing/2014/main" id="{F9CEE5CC-CC8E-0549-AE15-599CD12D2805}"/>
+                </a:ext>
+              </a:extLst>
+            </p:cNvPr>
+            <p:cNvCxnSpPr>
+              <a:cxnSpLocks/>
+            </p:cNvCxnSpPr>
+            <p:nvPr/>
+          </p:nvCxnSpPr>
+          <p:spPr>
+            <a:xfrm>
+              <a:off x="6219201" y="3318113"/>
+              <a:ext cx="0" cy="393700"/>
+            </a:xfrm>
+            <a:prstGeom prst="line">
+              <a:avLst/>
+            </a:prstGeom>
+            <a:grpFill/>
+            <a:ln w="25400">
+              <a:solidFill>
+                <a:srgbClr val="FF0000"/>
+              </a:solidFill>
+            </a:ln>
+          </p:spPr>
+          <p:style>
+            <a:lnRef idx="1">
+              <a:schemeClr val="accent1"/>
+            </a:lnRef>
+            <a:fillRef idx="0">
+              <a:schemeClr val="accent1"/>
+            </a:fillRef>
+            <a:effectRef idx="0">
+              <a:schemeClr val="accent1"/>
+            </a:effectRef>
+            <a:fontRef idx="minor">
+              <a:schemeClr val="tx1"/>
+            </a:fontRef>
+          </p:style>
+        </p:cxnSp>
+        <p:cxnSp>
+          <p:nvCxnSpPr>
+            <p:cNvPr id="63" name="Straight Connector 62">
+              <a:extLst>
+                <a:ext uri="{FF2B5EF4-FFF2-40B4-BE49-F238E27FC236}">
+                  <a16:creationId xmlns:a16="http://schemas.microsoft.com/office/drawing/2014/main" id="{8F545A99-5135-8D41-9842-FD4DF172F7F7}"/>
+                </a:ext>
+              </a:extLst>
+            </p:cNvPr>
+            <p:cNvCxnSpPr>
+              <a:cxnSpLocks/>
+            </p:cNvCxnSpPr>
+            <p:nvPr/>
+          </p:nvCxnSpPr>
+          <p:spPr>
+            <a:xfrm>
+              <a:off x="6013183" y="3477394"/>
+              <a:ext cx="463550" cy="0"/>
+            </a:xfrm>
+            <a:prstGeom prst="line">
+              <a:avLst/>
+            </a:prstGeom>
+            <a:grpFill/>
+            <a:ln w="25400">
+              <a:solidFill>
+                <a:srgbClr val="FF0000"/>
+              </a:solidFill>
+            </a:ln>
+          </p:spPr>
+          <p:style>
+            <a:lnRef idx="1">
+              <a:schemeClr val="accent1"/>
+            </a:lnRef>
+            <a:fillRef idx="0">
+              <a:schemeClr val="accent1"/>
+            </a:fillRef>
+            <a:effectRef idx="0">
+              <a:schemeClr val="accent1"/>
+            </a:effectRef>
+            <a:fontRef idx="minor">
+              <a:schemeClr val="tx1"/>
+            </a:fontRef>
+          </p:style>
+        </p:cxnSp>
+      </p:grpSp>
+      <p:grpSp>
+        <p:nvGrpSpPr>
+          <p:cNvPr id="64" name="Group 63">
+            <a:extLst>
+              <a:ext uri="{FF2B5EF4-FFF2-40B4-BE49-F238E27FC236}">
+                <a16:creationId xmlns:a16="http://schemas.microsoft.com/office/drawing/2014/main" id="{BEBE761D-D5EF-E242-A2EC-5DC43D0646E8}"/>
+              </a:ext>
+            </a:extLst>
+          </p:cNvPr>
+          <p:cNvGrpSpPr/>
+          <p:nvPr/>
+        </p:nvGrpSpPr>
+        <p:grpSpPr>
+          <a:xfrm>
+            <a:off x="5464370" y="2424496"/>
+            <a:ext cx="963090" cy="834518"/>
+            <a:chOff x="6013183" y="3111500"/>
+            <a:chExt cx="463550" cy="393700"/>
+          </a:xfrm>
+          <a:solidFill>
+            <a:srgbClr val="7030A0"/>
+          </a:solidFill>
+        </p:grpSpPr>
+        <p:sp>
+          <p:nvSpPr>
+            <p:cNvPr id="65" name="Oval 64">
+              <a:extLst>
+                <a:ext uri="{FF2B5EF4-FFF2-40B4-BE49-F238E27FC236}">
+                  <a16:creationId xmlns:a16="http://schemas.microsoft.com/office/drawing/2014/main" id="{2C648020-B26A-EB4B-94F3-4D83BCACDA20}"/>
+                </a:ext>
+              </a:extLst>
+            </p:cNvPr>
+            <p:cNvSpPr>
+              <a:spLocks noChangeAspect="1"/>
+            </p:cNvSpPr>
+            <p:nvPr/>
+          </p:nvSpPr>
+          <p:spPr>
+            <a:xfrm>
+              <a:off x="6178283" y="3263290"/>
+              <a:ext cx="91440" cy="91440"/>
+            </a:xfrm>
+            <a:prstGeom prst="ellipse">
+              <a:avLst/>
+            </a:prstGeom>
+            <a:grpFill/>
+            <a:ln w="25400">
+              <a:solidFill>
+                <a:srgbClr val="7030A0"/>
+              </a:solidFill>
+            </a:ln>
+          </p:spPr>
+          <p:style>
+            <a:lnRef idx="2">
+              <a:schemeClr val="accent1">
+                <a:shade val="50000"/>
+              </a:schemeClr>
+            </a:lnRef>
+            <a:fillRef idx="1">
+              <a:schemeClr val="accent1"/>
+            </a:fillRef>
+            <a:effectRef idx="0">
+              <a:schemeClr val="accent1"/>
+            </a:effectRef>
+            <a:fontRef idx="minor">
+              <a:schemeClr val="lt1"/>
+            </a:fontRef>
+          </p:style>
+          <p:txBody>
+            <a:bodyPr rtlCol="0" anchor="ctr"/>
+            <a:lstStyle/>
+            <a:p>
+              <a:pPr algn="ctr"/>
+              <a:endParaRPr lang="en-US"/>
+            </a:p>
+          </p:txBody>
+        </p:sp>
+        <p:cxnSp>
+          <p:nvCxnSpPr>
+            <p:cNvPr id="66" name="Straight Connector 65">
+              <a:extLst>
+                <a:ext uri="{FF2B5EF4-FFF2-40B4-BE49-F238E27FC236}">
+                  <a16:creationId xmlns:a16="http://schemas.microsoft.com/office/drawing/2014/main" id="{49F6AF18-DF19-A14D-B22D-EB42340F561A}"/>
+                </a:ext>
+              </a:extLst>
+            </p:cNvPr>
+            <p:cNvCxnSpPr>
+              <a:cxnSpLocks/>
+            </p:cNvCxnSpPr>
+            <p:nvPr/>
+          </p:nvCxnSpPr>
+          <p:spPr>
+            <a:xfrm>
+              <a:off x="6219201" y="3111500"/>
+              <a:ext cx="0" cy="393700"/>
+            </a:xfrm>
+            <a:prstGeom prst="line">
+              <a:avLst/>
+            </a:prstGeom>
+            <a:grpFill/>
+            <a:ln w="25400">
+              <a:solidFill>
+                <a:srgbClr val="7030A0"/>
+              </a:solidFill>
+            </a:ln>
+          </p:spPr>
+          <p:style>
+            <a:lnRef idx="1">
+              <a:schemeClr val="accent1"/>
+            </a:lnRef>
+            <a:fillRef idx="0">
+              <a:schemeClr val="accent1"/>
+            </a:fillRef>
+            <a:effectRef idx="0">
+              <a:schemeClr val="accent1"/>
+            </a:effectRef>
+            <a:fontRef idx="minor">
+              <a:schemeClr val="tx1"/>
+            </a:fontRef>
+          </p:style>
+        </p:cxnSp>
+        <p:cxnSp>
+          <p:nvCxnSpPr>
+            <p:cNvPr id="67" name="Straight Connector 66">
+              <a:extLst>
+                <a:ext uri="{FF2B5EF4-FFF2-40B4-BE49-F238E27FC236}">
+                  <a16:creationId xmlns:a16="http://schemas.microsoft.com/office/drawing/2014/main" id="{2D19E3C5-E44A-EF44-8265-B0733E5656CA}"/>
+                </a:ext>
+              </a:extLst>
+            </p:cNvPr>
+            <p:cNvCxnSpPr>
+              <a:cxnSpLocks/>
+            </p:cNvCxnSpPr>
+            <p:nvPr/>
+          </p:nvCxnSpPr>
+          <p:spPr>
+            <a:xfrm>
+              <a:off x="6013183" y="3308350"/>
+              <a:ext cx="463550" cy="0"/>
+            </a:xfrm>
+            <a:prstGeom prst="line">
+              <a:avLst/>
+            </a:prstGeom>
+            <a:grpFill/>
+            <a:ln w="25400">
+              <a:solidFill>
+                <a:srgbClr val="7030A0"/>
+              </a:solidFill>
+            </a:ln>
+          </p:spPr>
+          <p:style>
+            <a:lnRef idx="1">
+              <a:schemeClr val="accent1"/>
+            </a:lnRef>
+            <a:fillRef idx="0">
+              <a:schemeClr val="accent1"/>
+            </a:fillRef>
+            <a:effectRef idx="0">
+              <a:schemeClr val="accent1"/>
+            </a:effectRef>
+            <a:fontRef idx="minor">
+              <a:schemeClr val="tx1"/>
+            </a:fontRef>
+          </p:style>
+        </p:cxnSp>
+      </p:grpSp>
+      <p:sp>
+        <p:nvSpPr>
+          <p:cNvPr id="68" name="TextBox 67">
+            <a:extLst>
+              <a:ext uri="{FF2B5EF4-FFF2-40B4-BE49-F238E27FC236}">
+                <a16:creationId xmlns:a16="http://schemas.microsoft.com/office/drawing/2014/main" id="{D25E6A80-B0D5-1A4C-BE04-280E1D94D152}"/>
+              </a:ext>
+            </a:extLst>
+          </p:cNvPr>
+          <p:cNvSpPr txBox="1"/>
+          <p:nvPr/>
+        </p:nvSpPr>
+        <p:spPr>
+          <a:xfrm>
+            <a:off x="6852060" y="3276657"/>
+            <a:ext cx="950901" cy="369332"/>
+          </a:xfrm>
+          <a:prstGeom prst="rect">
+            <a:avLst/>
+          </a:prstGeom>
+          <a:noFill/>
+        </p:spPr>
+        <p:txBody>
+          <a:bodyPr wrap="none" rtlCol="0">
+            <a:spAutoFit/>
+          </a:bodyPr>
+          <a:lstStyle/>
+          <a:p>
+            <a:r>
+              <a:rPr lang="en-US" dirty="0">
+                <a:solidFill>
+                  <a:schemeClr val="bg1"/>
+                </a:solidFill>
+              </a:rPr>
+              <a:t>4.5 mm </a:t>
+            </a:r>
+          </a:p>
+        </p:txBody>
+      </p:sp>
+      <p:sp>
+        <p:nvSpPr>
+          <p:cNvPr id="69" name="Oval 68">
+            <a:extLst>
+              <a:ext uri="{FF2B5EF4-FFF2-40B4-BE49-F238E27FC236}">
+                <a16:creationId xmlns:a16="http://schemas.microsoft.com/office/drawing/2014/main" id="{49B83E92-31CE-4549-AD36-CE36B46B044D}"/>
+              </a:ext>
+            </a:extLst>
+          </p:cNvPr>
+          <p:cNvSpPr/>
+          <p:nvPr/>
+        </p:nvSpPr>
+        <p:spPr>
+          <a:xfrm>
+            <a:off x="6876903" y="3079927"/>
+            <a:ext cx="931173" cy="886272"/>
+          </a:xfrm>
+          <a:prstGeom prst="ellipse">
+            <a:avLst/>
+          </a:prstGeom>
+          <a:noFill/>
+          <a:ln w="38100">
+            <a:solidFill>
+              <a:srgbClr val="FF0000"/>
+            </a:solidFill>
+            <a:prstDash val="sysDash"/>
+          </a:ln>
+        </p:spPr>
+        <p:style>
+          <a:lnRef idx="2">
+            <a:schemeClr val="accent1">
+              <a:shade val="50000"/>
+            </a:schemeClr>
+          </a:lnRef>
+          <a:fillRef idx="1">
+            <a:schemeClr val="accent1"/>
+          </a:fillRef>
+          <a:effectRef idx="0">
+            <a:schemeClr val="accent1"/>
+          </a:effectRef>
+          <a:fontRef idx="minor">
+            <a:schemeClr val="lt1"/>
+          </a:fontRef>
+        </p:style>
+        <p:txBody>
+          <a:bodyPr rtlCol="0" anchor="ctr"/>
+          <a:lstStyle/>
+          <a:p>
+            <a:pPr algn="ctr"/>
+            <a:endParaRPr lang="en-US"/>
+          </a:p>
+        </p:txBody>
+      </p:sp>
+      <p:grpSp>
+        <p:nvGrpSpPr>
+          <p:cNvPr id="70" name="Group 69">
+            <a:extLst>
+              <a:ext uri="{FF2B5EF4-FFF2-40B4-BE49-F238E27FC236}">
+                <a16:creationId xmlns:a16="http://schemas.microsoft.com/office/drawing/2014/main" id="{68A4F8A1-EAA5-E64B-B0A9-970EF72F4CE4}"/>
+              </a:ext>
+            </a:extLst>
+          </p:cNvPr>
+          <p:cNvGrpSpPr/>
+          <p:nvPr/>
+        </p:nvGrpSpPr>
+        <p:grpSpPr>
+          <a:xfrm>
+            <a:off x="8794375" y="4235780"/>
+            <a:ext cx="3180662" cy="3081044"/>
+            <a:chOff x="8905956" y="3693029"/>
+            <a:chExt cx="3180662" cy="3081044"/>
+          </a:xfrm>
+        </p:grpSpPr>
+        <p:sp>
+          <p:nvSpPr>
+            <p:cNvPr id="71" name="Rectangle 70">
+              <a:extLst>
+                <a:ext uri="{FF2B5EF4-FFF2-40B4-BE49-F238E27FC236}">
+                  <a16:creationId xmlns:a16="http://schemas.microsoft.com/office/drawing/2014/main" id="{A37B1E94-C53B-BB4E-B215-D7F3D079DC91}"/>
+                </a:ext>
+              </a:extLst>
+            </p:cNvPr>
+            <p:cNvSpPr/>
+            <p:nvPr/>
+          </p:nvSpPr>
+          <p:spPr>
+            <a:xfrm>
+              <a:off x="8905956" y="3737155"/>
+              <a:ext cx="3180662" cy="3036918"/>
+            </a:xfrm>
+            <a:prstGeom prst="rect">
+              <a:avLst/>
+            </a:prstGeom>
+            <a:solidFill>
+              <a:srgbClr val="52BDB9">
+                <a:alpha val="43000"/>
+              </a:srgbClr>
+            </a:solidFill>
+            <a:ln>
+              <a:solidFill>
+                <a:schemeClr val="tx1"/>
+              </a:solidFill>
+            </a:ln>
+          </p:spPr>
+          <p:style>
+            <a:lnRef idx="2">
+              <a:schemeClr val="accent1">
+                <a:shade val="50000"/>
+              </a:schemeClr>
+            </a:lnRef>
+            <a:fillRef idx="1">
+              <a:schemeClr val="accent1"/>
+            </a:fillRef>
+            <a:effectRef idx="0">
+              <a:schemeClr val="accent1"/>
+            </a:effectRef>
+            <a:fontRef idx="minor">
+              <a:schemeClr val="lt1"/>
+            </a:fontRef>
+          </p:style>
+          <p:txBody>
+            <a:bodyPr rtlCol="0" anchor="ctr"/>
+            <a:lstStyle/>
+            <a:p>
+              <a:pPr algn="ctr"/>
+              <a:endParaRPr lang="en-US"/>
+            </a:p>
+          </p:txBody>
+        </p:sp>
+        <p:grpSp>
+          <p:nvGrpSpPr>
+            <p:cNvPr id="72" name="Group 71">
+              <a:extLst>
+                <a:ext uri="{FF2B5EF4-FFF2-40B4-BE49-F238E27FC236}">
+                  <a16:creationId xmlns:a16="http://schemas.microsoft.com/office/drawing/2014/main" id="{69C7730D-3449-CC4E-9DA7-89C765AFC6FB}"/>
+                </a:ext>
+              </a:extLst>
+            </p:cNvPr>
+            <p:cNvGrpSpPr/>
+            <p:nvPr/>
+          </p:nvGrpSpPr>
+          <p:grpSpPr>
+            <a:xfrm>
+              <a:off x="9246882" y="5064692"/>
+              <a:ext cx="963090" cy="834518"/>
+              <a:chOff x="6013183" y="3111500"/>
+              <a:chExt cx="463550" cy="393700"/>
+            </a:xfrm>
+            <a:solidFill>
+              <a:srgbClr val="FF0000"/>
+            </a:solidFill>
+          </p:grpSpPr>
+          <p:sp>
+            <p:nvSpPr>
+              <p:cNvPr id="82" name="Oval 81">
+                <a:extLst>
+                  <a:ext uri="{FF2B5EF4-FFF2-40B4-BE49-F238E27FC236}">
+                    <a16:creationId xmlns:a16="http://schemas.microsoft.com/office/drawing/2014/main" id="{1EF895FC-E38B-814F-8BD3-8373909C34F1}"/>
+                  </a:ext>
+                </a:extLst>
+              </p:cNvPr>
+              <p:cNvSpPr>
+                <a:spLocks noChangeAspect="1"/>
+              </p:cNvSpPr>
+              <p:nvPr/>
+            </p:nvSpPr>
+            <p:spPr>
+              <a:xfrm>
+                <a:off x="6178283" y="3263290"/>
+                <a:ext cx="91440" cy="91440"/>
+              </a:xfrm>
+              <a:prstGeom prst="ellipse">
+                <a:avLst/>
+              </a:prstGeom>
+              <a:grpFill/>
+              <a:ln w="25400">
+                <a:solidFill>
+                  <a:srgbClr val="FF0000"/>
+                </a:solidFill>
+              </a:ln>
+            </p:spPr>
+            <p:style>
+              <a:lnRef idx="2">
+                <a:schemeClr val="accent1">
+                  <a:shade val="50000"/>
+                </a:schemeClr>
+              </a:lnRef>
+              <a:fillRef idx="1">
+                <a:schemeClr val="accent1"/>
+              </a:fillRef>
+              <a:effectRef idx="0">
+                <a:schemeClr val="accent1"/>
+              </a:effectRef>
+              <a:fontRef idx="minor">
+                <a:schemeClr val="lt1"/>
+              </a:fontRef>
+            </p:style>
+            <p:txBody>
+              <a:bodyPr rtlCol="0" anchor="ctr"/>
+              <a:lstStyle/>
+              <a:p>
+                <a:pPr algn="ctr"/>
+                <a:endParaRPr lang="en-US"/>
+              </a:p>
+            </p:txBody>
+          </p:sp>
+          <p:cxnSp>
+            <p:nvCxnSpPr>
+              <p:cNvPr id="83" name="Straight Connector 82">
+                <a:extLst>
+                  <a:ext uri="{FF2B5EF4-FFF2-40B4-BE49-F238E27FC236}">
+                    <a16:creationId xmlns:a16="http://schemas.microsoft.com/office/drawing/2014/main" id="{93AFAB2B-C5B9-494A-BE2D-5F71020FBEBE}"/>
+                  </a:ext>
+                </a:extLst>
+              </p:cNvPr>
+              <p:cNvCxnSpPr>
+                <a:cxnSpLocks/>
+              </p:cNvCxnSpPr>
+              <p:nvPr/>
+            </p:nvCxnSpPr>
+            <p:spPr>
+              <a:xfrm>
+                <a:off x="6219201" y="3111500"/>
+                <a:ext cx="0" cy="393700"/>
+              </a:xfrm>
+              <a:prstGeom prst="line">
+                <a:avLst/>
+              </a:prstGeom>
+              <a:grpFill/>
+              <a:ln w="25400">
+                <a:solidFill>
+                  <a:srgbClr val="FF0000"/>
+                </a:solidFill>
+              </a:ln>
+            </p:spPr>
+            <p:style>
+              <a:lnRef idx="1">
+                <a:schemeClr val="accent1"/>
+              </a:lnRef>
+              <a:fillRef idx="0">
+                <a:schemeClr val="accent1"/>
+              </a:fillRef>
+              <a:effectRef idx="0">
+                <a:schemeClr val="accent1"/>
+              </a:effectRef>
+              <a:fontRef idx="minor">
+                <a:schemeClr val="tx1"/>
+              </a:fontRef>
+            </p:style>
+          </p:cxnSp>
+          <p:cxnSp>
+            <p:nvCxnSpPr>
+              <p:cNvPr id="84" name="Straight Connector 83">
+                <a:extLst>
+                  <a:ext uri="{FF2B5EF4-FFF2-40B4-BE49-F238E27FC236}">
+                    <a16:creationId xmlns:a16="http://schemas.microsoft.com/office/drawing/2014/main" id="{0BF16ABB-BA3E-0547-BB5E-C9A78A4ED3DF}"/>
+                  </a:ext>
+                </a:extLst>
+              </p:cNvPr>
+              <p:cNvCxnSpPr>
+                <a:cxnSpLocks/>
+              </p:cNvCxnSpPr>
+              <p:nvPr/>
+            </p:nvCxnSpPr>
+            <p:spPr>
+              <a:xfrm>
+                <a:off x="6013183" y="3308350"/>
+                <a:ext cx="463550" cy="0"/>
+              </a:xfrm>
+              <a:prstGeom prst="line">
+                <a:avLst/>
+              </a:prstGeom>
+              <a:grpFill/>
+              <a:ln w="25400">
+                <a:solidFill>
+                  <a:srgbClr val="FF0000"/>
+                </a:solidFill>
+              </a:ln>
+            </p:spPr>
+            <p:style>
+              <a:lnRef idx="1">
+                <a:schemeClr val="accent1"/>
+              </a:lnRef>
+              <a:fillRef idx="0">
+                <a:schemeClr val="accent1"/>
+              </a:fillRef>
+              <a:effectRef idx="0">
+                <a:schemeClr val="accent1"/>
+              </a:effectRef>
+              <a:fontRef idx="minor">
+                <a:schemeClr val="tx1"/>
+              </a:fontRef>
+            </p:style>
+          </p:cxnSp>
+        </p:grpSp>
+        <p:sp>
+          <p:nvSpPr>
+            <p:cNvPr id="73" name="TextBox 72">
+              <a:extLst>
+                <a:ext uri="{FF2B5EF4-FFF2-40B4-BE49-F238E27FC236}">
+                  <a16:creationId xmlns:a16="http://schemas.microsoft.com/office/drawing/2014/main" id="{A430B440-9A08-D649-A08E-4768F6A249E7}"/>
+                </a:ext>
+              </a:extLst>
+            </p:cNvPr>
+            <p:cNvSpPr txBox="1"/>
+            <p:nvPr/>
+          </p:nvSpPr>
+          <p:spPr>
+            <a:xfrm>
+              <a:off x="10268002" y="5297285"/>
+              <a:ext cx="1386342" cy="369332"/>
+            </a:xfrm>
+            <a:prstGeom prst="rect">
+              <a:avLst/>
+            </a:prstGeom>
+            <a:noFill/>
+          </p:spPr>
+          <p:txBody>
+            <a:bodyPr wrap="none" rtlCol="0">
+              <a:spAutoFit/>
+            </a:bodyPr>
+            <a:lstStyle/>
+            <a:p>
+              <a:r>
+                <a:rPr lang="en-US" dirty="0">
+                  <a:solidFill>
+                    <a:srgbClr val="FF0000"/>
+                  </a:solidFill>
+                </a:rPr>
+                <a:t>Rotation axis</a:t>
+              </a:r>
+            </a:p>
+          </p:txBody>
+        </p:sp>
+        <p:grpSp>
+          <p:nvGrpSpPr>
+            <p:cNvPr id="74" name="Group 73">
+              <a:extLst>
+                <a:ext uri="{FF2B5EF4-FFF2-40B4-BE49-F238E27FC236}">
+                  <a16:creationId xmlns:a16="http://schemas.microsoft.com/office/drawing/2014/main" id="{92127464-6140-AF48-BA37-CD322E62DD5D}"/>
+                </a:ext>
+              </a:extLst>
+            </p:cNvPr>
+            <p:cNvGrpSpPr/>
+            <p:nvPr/>
+          </p:nvGrpSpPr>
+          <p:grpSpPr>
+            <a:xfrm>
+              <a:off x="9246882" y="4106503"/>
+              <a:ext cx="963090" cy="834518"/>
+              <a:chOff x="6013183" y="3111500"/>
+              <a:chExt cx="463550" cy="393700"/>
+            </a:xfrm>
+            <a:solidFill>
+              <a:srgbClr val="7030A0"/>
+            </a:solidFill>
+          </p:grpSpPr>
+          <p:sp>
+            <p:nvSpPr>
+              <p:cNvPr id="79" name="Oval 78">
+                <a:extLst>
+                  <a:ext uri="{FF2B5EF4-FFF2-40B4-BE49-F238E27FC236}">
+                    <a16:creationId xmlns:a16="http://schemas.microsoft.com/office/drawing/2014/main" id="{F9703E31-2C08-134D-9306-DD30EC791A73}"/>
+                  </a:ext>
+                </a:extLst>
+              </p:cNvPr>
+              <p:cNvSpPr>
+                <a:spLocks noChangeAspect="1"/>
+              </p:cNvSpPr>
+              <p:nvPr/>
+            </p:nvSpPr>
+            <p:spPr>
+              <a:xfrm>
+                <a:off x="6178283" y="3263290"/>
+                <a:ext cx="91440" cy="91440"/>
+              </a:xfrm>
+              <a:prstGeom prst="ellipse">
+                <a:avLst/>
+              </a:prstGeom>
+              <a:grpFill/>
+              <a:ln w="25400">
+                <a:solidFill>
+                  <a:srgbClr val="7030A0"/>
+                </a:solidFill>
+              </a:ln>
+            </p:spPr>
+            <p:style>
+              <a:lnRef idx="2">
+                <a:schemeClr val="accent1">
+                  <a:shade val="50000"/>
+                </a:schemeClr>
+              </a:lnRef>
+              <a:fillRef idx="1">
+                <a:schemeClr val="accent1"/>
+              </a:fillRef>
+              <a:effectRef idx="0">
+                <a:schemeClr val="accent1"/>
+              </a:effectRef>
+              <a:fontRef idx="minor">
+                <a:schemeClr val="lt1"/>
+              </a:fontRef>
+            </p:style>
+            <p:txBody>
+              <a:bodyPr rtlCol="0" anchor="ctr"/>
+              <a:lstStyle/>
+              <a:p>
+                <a:pPr algn="ctr"/>
+                <a:endParaRPr lang="en-US"/>
+              </a:p>
+            </p:txBody>
+          </p:sp>
+          <p:cxnSp>
+            <p:nvCxnSpPr>
+              <p:cNvPr id="80" name="Straight Connector 79">
+                <a:extLst>
+                  <a:ext uri="{FF2B5EF4-FFF2-40B4-BE49-F238E27FC236}">
+                    <a16:creationId xmlns:a16="http://schemas.microsoft.com/office/drawing/2014/main" id="{172AE18B-C215-B149-856B-2BA82CD63F33}"/>
+                  </a:ext>
+                </a:extLst>
+              </p:cNvPr>
+              <p:cNvCxnSpPr>
+                <a:cxnSpLocks/>
+              </p:cNvCxnSpPr>
+              <p:nvPr/>
+            </p:nvCxnSpPr>
+            <p:spPr>
+              <a:xfrm>
+                <a:off x="6219201" y="3111500"/>
+                <a:ext cx="0" cy="393700"/>
+              </a:xfrm>
+              <a:prstGeom prst="line">
+                <a:avLst/>
+              </a:prstGeom>
+              <a:grpFill/>
+              <a:ln w="25400">
+                <a:solidFill>
+                  <a:srgbClr val="7030A0"/>
+                </a:solidFill>
+              </a:ln>
+            </p:spPr>
+            <p:style>
+              <a:lnRef idx="1">
+                <a:schemeClr val="accent1"/>
+              </a:lnRef>
+              <a:fillRef idx="0">
+                <a:schemeClr val="accent1"/>
+              </a:fillRef>
+              <a:effectRef idx="0">
+                <a:schemeClr val="accent1"/>
+              </a:effectRef>
+              <a:fontRef idx="minor">
+                <a:schemeClr val="tx1"/>
+              </a:fontRef>
+            </p:style>
+          </p:cxnSp>
+          <p:cxnSp>
+            <p:nvCxnSpPr>
+              <p:cNvPr id="81" name="Straight Connector 80">
+                <a:extLst>
+                  <a:ext uri="{FF2B5EF4-FFF2-40B4-BE49-F238E27FC236}">
+                    <a16:creationId xmlns:a16="http://schemas.microsoft.com/office/drawing/2014/main" id="{5426839E-D758-1F4E-AD2B-E4FEFA2A66AB}"/>
+                  </a:ext>
+                </a:extLst>
+              </p:cNvPr>
+              <p:cNvCxnSpPr>
+                <a:cxnSpLocks/>
+              </p:cNvCxnSpPr>
+              <p:nvPr/>
+            </p:nvCxnSpPr>
+            <p:spPr>
+              <a:xfrm>
+                <a:off x="6013183" y="3308350"/>
+                <a:ext cx="463550" cy="0"/>
+              </a:xfrm>
+              <a:prstGeom prst="line">
+                <a:avLst/>
+              </a:prstGeom>
+              <a:grpFill/>
+              <a:ln w="25400">
+                <a:solidFill>
+                  <a:srgbClr val="7030A0"/>
+                </a:solidFill>
+              </a:ln>
+            </p:spPr>
+            <p:style>
+              <a:lnRef idx="1">
+                <a:schemeClr val="accent1"/>
+              </a:lnRef>
+              <a:fillRef idx="0">
+                <a:schemeClr val="accent1"/>
+              </a:fillRef>
+              <a:effectRef idx="0">
+                <a:schemeClr val="accent1"/>
+              </a:effectRef>
+              <a:fontRef idx="minor">
+                <a:schemeClr val="tx1"/>
+              </a:fontRef>
+            </p:style>
+          </p:cxnSp>
+        </p:grpSp>
+        <p:sp>
+          <p:nvSpPr>
+            <p:cNvPr id="75" name="TextBox 74">
+              <a:extLst>
+                <a:ext uri="{FF2B5EF4-FFF2-40B4-BE49-F238E27FC236}">
+                  <a16:creationId xmlns:a16="http://schemas.microsoft.com/office/drawing/2014/main" id="{88F5205C-1926-A74B-8D4B-826690BBF155}"/>
+                </a:ext>
+              </a:extLst>
+            </p:cNvPr>
+            <p:cNvSpPr txBox="1"/>
+            <p:nvPr/>
+          </p:nvSpPr>
+          <p:spPr>
+            <a:xfrm>
+              <a:off x="10283031" y="4383713"/>
+              <a:ext cx="1697425" cy="646331"/>
+            </a:xfrm>
+            <a:prstGeom prst="rect">
+              <a:avLst/>
+            </a:prstGeom>
+            <a:noFill/>
+          </p:spPr>
+          <p:txBody>
+            <a:bodyPr wrap="square" rtlCol="0">
+              <a:spAutoFit/>
+            </a:bodyPr>
+            <a:lstStyle/>
+            <a:p>
+              <a:r>
+                <a:rPr lang="en-US" dirty="0">
+                  <a:solidFill>
+                    <a:srgbClr val="7030A0"/>
+                  </a:solidFill>
+                </a:rPr>
+                <a:t>Source activity center</a:t>
+              </a:r>
+            </a:p>
+          </p:txBody>
+        </p:sp>
+        <p:sp>
+          <p:nvSpPr>
+            <p:cNvPr id="76" name="TextBox 75">
+              <a:extLst>
+                <a:ext uri="{FF2B5EF4-FFF2-40B4-BE49-F238E27FC236}">
+                  <a16:creationId xmlns:a16="http://schemas.microsoft.com/office/drawing/2014/main" id="{36D6EDA3-4B6C-B941-BC98-4D38781F203A}"/>
+                </a:ext>
+              </a:extLst>
+            </p:cNvPr>
+            <p:cNvSpPr txBox="1"/>
+            <p:nvPr/>
+          </p:nvSpPr>
+          <p:spPr>
+            <a:xfrm>
+              <a:off x="9723235" y="6026191"/>
+              <a:ext cx="2257221" cy="369332"/>
+            </a:xfrm>
+            <a:prstGeom prst="rect">
+              <a:avLst/>
+            </a:prstGeom>
+            <a:noFill/>
+          </p:spPr>
+          <p:txBody>
+            <a:bodyPr wrap="none" rtlCol="0">
+              <a:spAutoFit/>
+            </a:bodyPr>
+            <a:lstStyle/>
+            <a:p>
+              <a:r>
+                <a:rPr lang="en-US" dirty="0">
+                  <a:solidFill>
+                    <a:srgbClr val="FF0000"/>
+                  </a:solidFill>
+                </a:rPr>
+                <a:t>Important dimensions</a:t>
+              </a:r>
+            </a:p>
+          </p:txBody>
+        </p:sp>
+        <p:sp>
+          <p:nvSpPr>
+            <p:cNvPr id="78" name="TextBox 77">
+              <a:extLst>
+                <a:ext uri="{FF2B5EF4-FFF2-40B4-BE49-F238E27FC236}">
+                  <a16:creationId xmlns:a16="http://schemas.microsoft.com/office/drawing/2014/main" id="{6720DEBC-F7DD-014B-9B78-01D75001E522}"/>
+                </a:ext>
+              </a:extLst>
+            </p:cNvPr>
+            <p:cNvSpPr txBox="1"/>
+            <p:nvPr/>
+          </p:nvSpPr>
+          <p:spPr>
+            <a:xfrm>
+              <a:off x="10011179" y="3693029"/>
+              <a:ext cx="1087798" cy="461665"/>
+            </a:xfrm>
+            <a:prstGeom prst="rect">
+              <a:avLst/>
+            </a:prstGeom>
+            <a:noFill/>
+          </p:spPr>
+          <p:txBody>
+            <a:bodyPr wrap="none" rtlCol="0">
+              <a:spAutoFit/>
+            </a:bodyPr>
+            <a:lstStyle/>
+            <a:p>
+              <a:r>
+                <a:rPr lang="en-US" sz="2400" dirty="0"/>
+                <a:t>Legend</a:t>
+              </a:r>
+            </a:p>
+          </p:txBody>
+        </p:sp>
+      </p:grpSp>
+      <p:sp>
+        <p:nvSpPr>
+          <p:cNvPr id="85" name="Oval 84">
+            <a:extLst>
+              <a:ext uri="{FF2B5EF4-FFF2-40B4-BE49-F238E27FC236}">
+                <a16:creationId xmlns:a16="http://schemas.microsoft.com/office/drawing/2014/main" id="{52E6E315-BBF3-1846-AE52-5DAD73932FA7}"/>
+              </a:ext>
+            </a:extLst>
+          </p:cNvPr>
+          <p:cNvSpPr/>
+          <p:nvPr/>
+        </p:nvSpPr>
+        <p:spPr>
+          <a:xfrm>
+            <a:off x="8467991" y="2634712"/>
+            <a:ext cx="712315" cy="648952"/>
+          </a:xfrm>
+          <a:prstGeom prst="ellipse">
+            <a:avLst/>
+          </a:prstGeom>
+          <a:noFill/>
+          <a:ln w="38100">
+            <a:solidFill>
+              <a:srgbClr val="FF0000"/>
+            </a:solidFill>
+            <a:prstDash val="sysDash"/>
+          </a:ln>
+        </p:spPr>
+        <p:style>
+          <a:lnRef idx="2">
+            <a:schemeClr val="accent1">
+              <a:shade val="50000"/>
+            </a:schemeClr>
+          </a:lnRef>
+          <a:fillRef idx="1">
+            <a:schemeClr val="accent1"/>
+          </a:fillRef>
+          <a:effectRef idx="0">
+            <a:schemeClr val="accent1"/>
+          </a:effectRef>
+          <a:fontRef idx="minor">
+            <a:schemeClr val="lt1"/>
+          </a:fontRef>
+        </p:style>
+        <p:txBody>
+          <a:bodyPr rtlCol="0" anchor="ctr"/>
+          <a:lstStyle/>
+          <a:p>
+            <a:pPr algn="ctr"/>
+            <a:endParaRPr lang="en-US"/>
+          </a:p>
+        </p:txBody>
+      </p:sp>
+      <p:sp>
+        <p:nvSpPr>
+          <p:cNvPr id="11" name="Oval 10">
+            <a:extLst>
+              <a:ext uri="{FF2B5EF4-FFF2-40B4-BE49-F238E27FC236}">
+                <a16:creationId xmlns:a16="http://schemas.microsoft.com/office/drawing/2014/main" id="{BCEDB8CD-DE55-FE41-AF8F-39BA896C629E}"/>
+              </a:ext>
+            </a:extLst>
+          </p:cNvPr>
+          <p:cNvSpPr/>
+          <p:nvPr/>
+        </p:nvSpPr>
+        <p:spPr>
+          <a:xfrm>
+            <a:off x="8994105" y="6504677"/>
+            <a:ext cx="549242" cy="581525"/>
+          </a:xfrm>
+          <a:prstGeom prst="ellipse">
+            <a:avLst/>
+          </a:prstGeom>
+          <a:noFill/>
+          <a:ln w="38100">
+            <a:solidFill>
+              <a:srgbClr val="FF0000"/>
+            </a:solidFill>
+            <a:prstDash val="sysDash"/>
+          </a:ln>
+        </p:spPr>
+        <p:style>
+          <a:lnRef idx="2">
+            <a:schemeClr val="accent1">
+              <a:shade val="50000"/>
+            </a:schemeClr>
+          </a:lnRef>
+          <a:fillRef idx="1">
+            <a:schemeClr val="accent1"/>
+          </a:fillRef>
+          <a:effectRef idx="0">
+            <a:schemeClr val="accent1"/>
+          </a:effectRef>
+          <a:fontRef idx="minor">
+            <a:schemeClr val="lt1"/>
+          </a:fontRef>
+        </p:style>
+        <p:txBody>
+          <a:bodyPr rtlCol="0" anchor="ctr"/>
+          <a:lstStyle/>
+          <a:p>
+            <a:pPr algn="ctr"/>
+            <a:endParaRPr lang="en-US"/>
+          </a:p>
+        </p:txBody>
+      </p:sp>
+      <p:sp>
+        <p:nvSpPr>
+          <p:cNvPr id="86" name="Oval 85">
+            <a:extLst>
+              <a:ext uri="{FF2B5EF4-FFF2-40B4-BE49-F238E27FC236}">
+                <a16:creationId xmlns:a16="http://schemas.microsoft.com/office/drawing/2014/main" id="{FF68F25D-034A-814B-A25C-C1876222306F}"/>
+              </a:ext>
+            </a:extLst>
+          </p:cNvPr>
+          <p:cNvSpPr/>
+          <p:nvPr/>
+        </p:nvSpPr>
+        <p:spPr>
+          <a:xfrm>
+            <a:off x="7632901" y="5180670"/>
+            <a:ext cx="712315" cy="648952"/>
+          </a:xfrm>
+          <a:prstGeom prst="ellipse">
+            <a:avLst/>
+          </a:prstGeom>
+          <a:noFill/>
+          <a:ln w="38100">
+            <a:solidFill>
+              <a:srgbClr val="FF0000"/>
+            </a:solidFill>
+            <a:prstDash val="sysDash"/>
+          </a:ln>
+        </p:spPr>
+        <p:style>
+          <a:lnRef idx="2">
+            <a:schemeClr val="accent1">
+              <a:shade val="50000"/>
+            </a:schemeClr>
+          </a:lnRef>
+          <a:fillRef idx="1">
+            <a:schemeClr val="accent1"/>
+          </a:fillRef>
+          <a:effectRef idx="0">
+            <a:schemeClr val="accent1"/>
+          </a:effectRef>
+          <a:fontRef idx="minor">
+            <a:schemeClr val="lt1"/>
+          </a:fontRef>
+        </p:style>
+        <p:txBody>
+          <a:bodyPr rtlCol="0" anchor="ctr"/>
+          <a:lstStyle/>
+          <a:p>
+            <a:pPr algn="ctr"/>
+            <a:endParaRPr lang="en-US"/>
+          </a:p>
+        </p:txBody>
+      </p:sp>
+      <p:sp>
+        <p:nvSpPr>
+          <p:cNvPr id="14" name="TextBox 13">
+            <a:extLst>
+              <a:ext uri="{FF2B5EF4-FFF2-40B4-BE49-F238E27FC236}">
+                <a16:creationId xmlns:a16="http://schemas.microsoft.com/office/drawing/2014/main" id="{BE8A397E-6E42-E640-8424-D985422BA848}"/>
+              </a:ext>
+            </a:extLst>
+          </p:cNvPr>
+          <p:cNvSpPr txBox="1"/>
+          <p:nvPr/>
+        </p:nvSpPr>
+        <p:spPr>
+          <a:xfrm>
+            <a:off x="3530681" y="4514885"/>
+            <a:ext cx="1975669" cy="369332"/>
+          </a:xfrm>
+          <a:prstGeom prst="rect">
+            <a:avLst/>
+          </a:prstGeom>
+          <a:solidFill>
+            <a:schemeClr val="bg2">
+              <a:lumMod val="90000"/>
+              <a:alpha val="61000"/>
+            </a:schemeClr>
+          </a:solidFill>
+        </p:spPr>
+        <p:txBody>
+          <a:bodyPr wrap="none" rtlCol="0">
+            <a:spAutoFit/>
+          </a:bodyPr>
+          <a:lstStyle/>
+          <a:p>
+            <a:r>
+              <a:rPr lang="en-US" dirty="0">
+                <a:solidFill>
+                  <a:srgbClr val="00B0F0"/>
+                </a:solidFill>
+              </a:rPr>
+              <a:t>Center of g10 shaft</a:t>
+            </a:r>
+          </a:p>
+        </p:txBody>
+      </p:sp>
+      <p:cxnSp>
+        <p:nvCxnSpPr>
+          <p:cNvPr id="87" name="Straight Arrow Connector 86">
+            <a:extLst>
+              <a:ext uri="{FF2B5EF4-FFF2-40B4-BE49-F238E27FC236}">
+                <a16:creationId xmlns:a16="http://schemas.microsoft.com/office/drawing/2014/main" id="{56C59DDA-A7C1-7742-87E3-D03F80F8E1C2}"/>
+              </a:ext>
+            </a:extLst>
+          </p:cNvPr>
+          <p:cNvCxnSpPr>
+            <a:cxnSpLocks/>
+          </p:cNvCxnSpPr>
+          <p:nvPr/>
+        </p:nvCxnSpPr>
+        <p:spPr>
+          <a:xfrm flipH="1" flipV="1">
+            <a:off x="3883610" y="4075733"/>
+            <a:ext cx="13828" cy="360000"/>
+          </a:xfrm>
+          <a:prstGeom prst="straightConnector1">
+            <a:avLst/>
+          </a:prstGeom>
+          <a:ln w="38100">
+            <a:solidFill>
+              <a:schemeClr val="tx1"/>
+            </a:solidFill>
+            <a:headEnd type="triangle"/>
+            <a:tailEnd type="triangle"/>
+          </a:ln>
+        </p:spPr>
+        <p:style>
+          <a:lnRef idx="1">
+            <a:schemeClr val="accent1"/>
+          </a:lnRef>
+          <a:fillRef idx="0">
+            <a:schemeClr val="accent1"/>
+          </a:fillRef>
+          <a:effectRef idx="0">
+            <a:schemeClr val="accent1"/>
+          </a:effectRef>
+          <a:fontRef idx="minor">
+            <a:schemeClr val="tx1"/>
+          </a:fontRef>
+        </p:style>
+      </p:cxnSp>
+      <p:sp>
+        <p:nvSpPr>
+          <p:cNvPr id="23" name="TextBox 22">
+            <a:extLst>
+              <a:ext uri="{FF2B5EF4-FFF2-40B4-BE49-F238E27FC236}">
+                <a16:creationId xmlns:a16="http://schemas.microsoft.com/office/drawing/2014/main" id="{F1B50954-84C3-C64A-8B75-7637869A4B2F}"/>
+              </a:ext>
+            </a:extLst>
+          </p:cNvPr>
+          <p:cNvSpPr txBox="1"/>
+          <p:nvPr/>
+        </p:nvSpPr>
+        <p:spPr>
+          <a:xfrm>
+            <a:off x="3211095" y="4093870"/>
+            <a:ext cx="723275" cy="369332"/>
+          </a:xfrm>
+          <a:prstGeom prst="rect">
+            <a:avLst/>
+          </a:prstGeom>
+          <a:noFill/>
+        </p:spPr>
+        <p:txBody>
+          <a:bodyPr wrap="none" rtlCol="0">
+            <a:spAutoFit/>
+          </a:bodyPr>
+          <a:lstStyle/>
+          <a:p>
+            <a:r>
+              <a:rPr lang="en-US" dirty="0"/>
+              <a:t>1 mm</a:t>
+            </a:r>
+          </a:p>
+        </p:txBody>
+      </p:sp>
+      <p:cxnSp>
+        <p:nvCxnSpPr>
+          <p:cNvPr id="88" name="Straight Connector 87">
+            <a:extLst>
+              <a:ext uri="{FF2B5EF4-FFF2-40B4-BE49-F238E27FC236}">
+                <a16:creationId xmlns:a16="http://schemas.microsoft.com/office/drawing/2014/main" id="{F9B25975-563E-C348-96CE-DBBB6276BBAD}"/>
+              </a:ext>
+            </a:extLst>
+          </p:cNvPr>
+          <p:cNvCxnSpPr>
+            <a:cxnSpLocks/>
+          </p:cNvCxnSpPr>
+          <p:nvPr/>
+        </p:nvCxnSpPr>
+        <p:spPr>
+          <a:xfrm flipV="1">
+            <a:off x="8345216" y="2934952"/>
+            <a:ext cx="0" cy="4491435"/>
+          </a:xfrm>
+          <a:prstGeom prst="line">
+            <a:avLst/>
+          </a:prstGeom>
+          <a:ln w="28575">
+            <a:solidFill>
+              <a:schemeClr val="bg1">
+                <a:lumMod val="50000"/>
+              </a:schemeClr>
+            </a:solidFill>
+            <a:prstDash val="sysDot"/>
+          </a:ln>
+        </p:spPr>
+        <p:style>
+          <a:lnRef idx="1">
+            <a:schemeClr val="accent1"/>
+          </a:lnRef>
+          <a:fillRef idx="0">
+            <a:schemeClr val="accent1"/>
+          </a:fillRef>
+          <a:effectRef idx="0">
+            <a:schemeClr val="accent1"/>
+          </a:effectRef>
+          <a:fontRef idx="minor">
+            <a:schemeClr val="tx1"/>
+          </a:fontRef>
+        </p:style>
+      </p:cxnSp>
+    </p:spTree>
+    <p:extLst>
+      <p:ext uri="{BB962C8B-B14F-4D97-AF65-F5344CB8AC3E}">
+        <p14:creationId xmlns:p14="http://schemas.microsoft.com/office/powerpoint/2010/main" val="3801189410"/>
+      </p:ext>
+    </p:extLst>
+  </p:cSld>
+  <p:clrMapOvr>
+    <a:masterClrMapping/>
+  </p:clrMapOvr>
+</p:sld>
+</file>
+
 <file path=ppt/theme/theme1.xml><?xml version="1.0" encoding="utf-8"?>
 <a:theme xmlns:a="http://schemas.openxmlformats.org/drawingml/2006/main" name="Office Theme">
   <a:themeElements>

</xml_diff>